<commit_message>
+ Added sections + Added animations
</commit_message>
<xml_diff>
--- a/ABB_KMRosso.pptx
+++ b/ABB_KMRosso.pptx
@@ -156,6 +156,75 @@
     </a:lvl9pPr>
   </p:defaultTextStyle>
   <p:extLst>
+    <p:ext uri="{521415D9-36F7-43E2-AB2F-B90AF26B5E84}">
+      <p14:sectionLst xmlns:p14="http://schemas.microsoft.com/office/powerpoint/2010/main">
+        <p14:section name="Presentazione" id="{8E5E13D4-FB4F-47E6-B3B3-714A4635C33C}">
+          <p14:sldIdLst>
+            <p14:sldId id="256"/>
+          </p14:sldIdLst>
+        </p14:section>
+        <p14:section name="Introduzione" id="{619D11A5-ABCE-42E3-A3B8-4D49AA698511}">
+          <p14:sldIdLst>
+            <p14:sldId id="257"/>
+            <p14:sldId id="259"/>
+            <p14:sldId id="258"/>
+          </p14:sldIdLst>
+        </p14:section>
+        <p14:section name="Il progetto" id="{D5B3C956-BE3C-41EB-A141-BF8868F5086B}">
+          <p14:sldIdLst>
+            <p14:sldId id="263"/>
+            <p14:sldId id="262"/>
+            <p14:sldId id="261"/>
+            <p14:sldId id="260"/>
+            <p14:sldId id="264"/>
+            <p14:sldId id="265"/>
+            <p14:sldId id="266"/>
+            <p14:sldId id="267"/>
+            <p14:sldId id="268"/>
+            <p14:sldId id="269"/>
+          </p14:sldIdLst>
+        </p14:section>
+        <p14:section name="La teoria dei robot" id="{4BB87F0B-23F7-4002-BAB1-14E7F19776B0}">
+          <p14:sldIdLst>
+            <p14:sldId id="270"/>
+            <p14:sldId id="272"/>
+            <p14:sldId id="273"/>
+            <p14:sldId id="274"/>
+            <p14:sldId id="275"/>
+            <p14:sldId id="276"/>
+            <p14:sldId id="304"/>
+            <p14:sldId id="277"/>
+            <p14:sldId id="278"/>
+            <p14:sldId id="279"/>
+            <p14:sldId id="280"/>
+            <p14:sldId id="281"/>
+            <p14:sldId id="282"/>
+            <p14:sldId id="283"/>
+            <p14:sldId id="284"/>
+            <p14:sldId id="285"/>
+            <p14:sldId id="286"/>
+            <p14:sldId id="287"/>
+            <p14:sldId id="288"/>
+            <p14:sldId id="289"/>
+            <p14:sldId id="290"/>
+            <p14:sldId id="291"/>
+            <p14:sldId id="292"/>
+            <p14:sldId id="293"/>
+            <p14:sldId id="294"/>
+            <p14:sldId id="295"/>
+            <p14:sldId id="296"/>
+            <p14:sldId id="297"/>
+            <p14:sldId id="298"/>
+            <p14:sldId id="299"/>
+            <p14:sldId id="300"/>
+            <p14:sldId id="301"/>
+            <p14:sldId id="302"/>
+            <p14:sldId id="303"/>
+            <p14:sldId id="271"/>
+          </p14:sldIdLst>
+        </p14:section>
+      </p14:sectionLst>
+    </p:ext>
     <p:ext uri="{EFAFB233-063F-42B5-8137-9DF3F51BA10A}">
       <p15:sldGuideLst xmlns:p15="http://schemas.microsoft.com/office/powerpoint/2012/main">
         <p15:guide id="1" orient="horz" pos="1620">
@@ -7744,15 +7813,33 @@
                                   </p:childTnLst>
                                 </p:cTn>
                               </p:par>
+                            </p:childTnLst>
+                          </p:cTn>
+                        </p:par>
+                      </p:childTnLst>
+                    </p:cTn>
+                  </p:par>
+                  <p:par>
+                    <p:cTn id="8" fill="hold">
+                      <p:stCondLst>
+                        <p:cond delay="indefinite"/>
+                      </p:stCondLst>
+                      <p:childTnLst>
+                        <p:par>
+                          <p:cTn id="9" fill="hold">
+                            <p:stCondLst>
+                              <p:cond delay="0"/>
+                            </p:stCondLst>
+                            <p:childTnLst>
                               <p:par>
-                                <p:cTn id="8" presetID="10" presetClass="entr" presetSubtype="0" fill="hold" grpId="0" nodeType="withEffect">
+                                <p:cTn id="10" presetID="10" presetClass="entr" presetSubtype="0" fill="hold" grpId="0" nodeType="clickEffect">
                                   <p:stCondLst>
                                     <p:cond delay="0"/>
                                   </p:stCondLst>
                                   <p:childTnLst>
                                     <p:set>
                                       <p:cBhvr>
-                                        <p:cTn id="9" dur="1" fill="hold">
+                                        <p:cTn id="11" dur="1" fill="hold">
                                           <p:stCondLst>
                                             <p:cond delay="0"/>
                                           </p:stCondLst>
@@ -7770,7 +7857,7 @@
                                     </p:set>
                                     <p:animEffect transition="in" filter="fade">
                                       <p:cBhvr>
-                                        <p:cTn id="10" dur="500"/>
+                                        <p:cTn id="12" dur="500"/>
                                         <p:tgtEl>
                                           <p:spTgt spid="21"/>
                                         </p:tgtEl>
@@ -7779,15 +7866,33 @@
                                   </p:childTnLst>
                                 </p:cTn>
                               </p:par>
+                            </p:childTnLst>
+                          </p:cTn>
+                        </p:par>
+                      </p:childTnLst>
+                    </p:cTn>
+                  </p:par>
+                  <p:par>
+                    <p:cTn id="13" fill="hold">
+                      <p:stCondLst>
+                        <p:cond delay="indefinite"/>
+                      </p:stCondLst>
+                      <p:childTnLst>
+                        <p:par>
+                          <p:cTn id="14" fill="hold">
+                            <p:stCondLst>
+                              <p:cond delay="0"/>
+                            </p:stCondLst>
+                            <p:childTnLst>
                               <p:par>
-                                <p:cTn id="11" presetID="10" presetClass="entr" presetSubtype="0" fill="hold" nodeType="withEffect">
+                                <p:cTn id="15" presetID="10" presetClass="entr" presetSubtype="0" fill="hold" nodeType="clickEffect">
                                   <p:stCondLst>
                                     <p:cond delay="0"/>
                                   </p:stCondLst>
                                   <p:childTnLst>
                                     <p:set>
                                       <p:cBhvr>
-                                        <p:cTn id="12" dur="1" fill="hold">
+                                        <p:cTn id="16" dur="1" fill="hold">
                                           <p:stCondLst>
                                             <p:cond delay="0"/>
                                           </p:stCondLst>
@@ -7805,7 +7910,7 @@
                                     </p:set>
                                     <p:animEffect transition="in" filter="fade">
                                       <p:cBhvr>
-                                        <p:cTn id="13" dur="500"/>
+                                        <p:cTn id="17" dur="500"/>
                                         <p:tgtEl>
                                           <p:spTgt spid="22"/>
                                         </p:tgtEl>
@@ -7821,26 +7926,26 @@
                     </p:cTn>
                   </p:par>
                   <p:par>
-                    <p:cTn id="14" fill="hold">
+                    <p:cTn id="18" fill="hold">
                       <p:stCondLst>
                         <p:cond delay="indefinite"/>
                       </p:stCondLst>
                       <p:childTnLst>
                         <p:par>
-                          <p:cTn id="15" fill="hold">
+                          <p:cTn id="19" fill="hold">
                             <p:stCondLst>
                               <p:cond delay="0"/>
                             </p:stCondLst>
                             <p:childTnLst>
                               <p:par>
-                                <p:cTn id="16" presetID="1" presetClass="entr" presetSubtype="0" fill="hold" nodeType="clickEffect">
+                                <p:cTn id="20" presetID="1" presetClass="entr" presetSubtype="0" fill="hold" nodeType="clickEffect">
                                   <p:stCondLst>
                                     <p:cond delay="0"/>
                                   </p:stCondLst>
                                   <p:childTnLst>
                                     <p:set>
                                       <p:cBhvr>
-                                        <p:cTn id="17" dur="1" fill="hold">
+                                        <p:cTn id="21" dur="1" fill="hold">
                                           <p:stCondLst>
                                             <p:cond delay="0"/>
                                           </p:stCondLst>
@@ -7866,26 +7971,61 @@
                     </p:cTn>
                   </p:par>
                   <p:par>
-                    <p:cTn id="18" fill="hold">
+                    <p:cTn id="22" fill="hold">
                       <p:stCondLst>
                         <p:cond delay="indefinite"/>
                       </p:stCondLst>
                       <p:childTnLst>
                         <p:par>
-                          <p:cTn id="19" fill="hold">
+                          <p:cTn id="23" fill="hold">
                             <p:stCondLst>
                               <p:cond delay="0"/>
                             </p:stCondLst>
                             <p:childTnLst>
                               <p:par>
-                                <p:cTn id="20" presetID="10" presetClass="entr" presetSubtype="0" fill="hold" grpId="0" nodeType="clickEffect">
+                                <p:cTn id="24" presetID="10" presetClass="entr" presetSubtype="0" fill="hold" grpId="0" nodeType="clickEffect">
                                   <p:stCondLst>
                                     <p:cond delay="0"/>
                                   </p:stCondLst>
                                   <p:childTnLst>
                                     <p:set>
                                       <p:cBhvr>
-                                        <p:cTn id="21" dur="1" fill="hold">
+                                        <p:cTn id="25" dur="1" fill="hold">
+                                          <p:stCondLst>
+                                            <p:cond delay="0"/>
+                                          </p:stCondLst>
+                                        </p:cTn>
+                                        <p:tgtEl>
+                                          <p:spTgt spid="16"/>
+                                        </p:tgtEl>
+                                        <p:attrNameLst>
+                                          <p:attrName>style.visibility</p:attrName>
+                                        </p:attrNameLst>
+                                      </p:cBhvr>
+                                      <p:to>
+                                        <p:strVal val="visible"/>
+                                      </p:to>
+                                    </p:set>
+                                    <p:animEffect transition="in" filter="fade">
+                                      <p:cBhvr>
+                                        <p:cTn id="26" dur="500"/>
+                                        <p:tgtEl>
+                                          <p:spTgt spid="16"/>
+                                        </p:tgtEl>
+                                      </p:cBhvr>
+                                    </p:animEffect>
+                                  </p:childTnLst>
+                                </p:cTn>
+                              </p:par>
+                              <p:par>
+                                <p:cTn id="27" presetID="10" presetClass="entr" presetSubtype="0" fill="hold" grpId="0" nodeType="withEffect">
+                                  <p:stCondLst>
+                                    <p:cond delay="0"/>
+                                  </p:stCondLst>
+                                  <p:childTnLst>
+                                    <p:set>
+                                      <p:cBhvr>
+                                        <p:cTn id="28" dur="1" fill="hold">
                                           <p:stCondLst>
                                             <p:cond delay="0"/>
                                           </p:stCondLst>
@@ -7903,44 +8043,9 @@
                                     </p:set>
                                     <p:animEffect transition="in" filter="fade">
                                       <p:cBhvr>
-                                        <p:cTn id="22" dur="500"/>
+                                        <p:cTn id="29" dur="500"/>
                                         <p:tgtEl>
                                           <p:spTgt spid="15"/>
-                                        </p:tgtEl>
-                                      </p:cBhvr>
-                                    </p:animEffect>
-                                  </p:childTnLst>
-                                </p:cTn>
-                              </p:par>
-                              <p:par>
-                                <p:cTn id="23" presetID="10" presetClass="entr" presetSubtype="0" fill="hold" grpId="0" nodeType="withEffect">
-                                  <p:stCondLst>
-                                    <p:cond delay="0"/>
-                                  </p:stCondLst>
-                                  <p:childTnLst>
-                                    <p:set>
-                                      <p:cBhvr>
-                                        <p:cTn id="24" dur="1" fill="hold">
-                                          <p:stCondLst>
-                                            <p:cond delay="0"/>
-                                          </p:stCondLst>
-                                        </p:cTn>
-                                        <p:tgtEl>
-                                          <p:spTgt spid="16"/>
-                                        </p:tgtEl>
-                                        <p:attrNameLst>
-                                          <p:attrName>style.visibility</p:attrName>
-                                        </p:attrNameLst>
-                                      </p:cBhvr>
-                                      <p:to>
-                                        <p:strVal val="visible"/>
-                                      </p:to>
-                                    </p:set>
-                                    <p:animEffect transition="in" filter="fade">
-                                      <p:cBhvr>
-                                        <p:cTn id="25" dur="500"/>
-                                        <p:tgtEl>
-                                          <p:spTgt spid="16"/>
                                         </p:tgtEl>
                                       </p:cBhvr>
                                     </p:animEffect>
@@ -7954,26 +8059,61 @@
                     </p:cTn>
                   </p:par>
                   <p:par>
-                    <p:cTn id="26" fill="hold">
+                    <p:cTn id="30" fill="hold">
                       <p:stCondLst>
                         <p:cond delay="indefinite"/>
                       </p:stCondLst>
                       <p:childTnLst>
                         <p:par>
-                          <p:cTn id="27" fill="hold">
+                          <p:cTn id="31" fill="hold">
                             <p:stCondLst>
                               <p:cond delay="0"/>
                             </p:stCondLst>
                             <p:childTnLst>
                               <p:par>
-                                <p:cTn id="28" presetID="10" presetClass="entr" presetSubtype="0" fill="hold" grpId="0" nodeType="clickEffect">
+                                <p:cTn id="32" presetID="10" presetClass="entr" presetSubtype="0" fill="hold" grpId="0" nodeType="clickEffect">
                                   <p:stCondLst>
                                     <p:cond delay="0"/>
                                   </p:stCondLst>
                                   <p:childTnLst>
                                     <p:set>
                                       <p:cBhvr>
-                                        <p:cTn id="29" dur="1" fill="hold">
+                                        <p:cTn id="33" dur="1" fill="hold">
+                                          <p:stCondLst>
+                                            <p:cond delay="0"/>
+                                          </p:stCondLst>
+                                        </p:cTn>
+                                        <p:tgtEl>
+                                          <p:spTgt spid="18"/>
+                                        </p:tgtEl>
+                                        <p:attrNameLst>
+                                          <p:attrName>style.visibility</p:attrName>
+                                        </p:attrNameLst>
+                                      </p:cBhvr>
+                                      <p:to>
+                                        <p:strVal val="visible"/>
+                                      </p:to>
+                                    </p:set>
+                                    <p:animEffect transition="in" filter="fade">
+                                      <p:cBhvr>
+                                        <p:cTn id="34" dur="500"/>
+                                        <p:tgtEl>
+                                          <p:spTgt spid="18"/>
+                                        </p:tgtEl>
+                                      </p:cBhvr>
+                                    </p:animEffect>
+                                  </p:childTnLst>
+                                </p:cTn>
+                              </p:par>
+                              <p:par>
+                                <p:cTn id="35" presetID="10" presetClass="entr" presetSubtype="0" fill="hold" grpId="0" nodeType="withEffect">
+                                  <p:stCondLst>
+                                    <p:cond delay="0"/>
+                                  </p:stCondLst>
+                                  <p:childTnLst>
+                                    <p:set>
+                                      <p:cBhvr>
+                                        <p:cTn id="36" dur="1" fill="hold">
                                           <p:stCondLst>
                                             <p:cond delay="0"/>
                                           </p:stCondLst>
@@ -7991,44 +8131,9 @@
                                     </p:set>
                                     <p:animEffect transition="in" filter="fade">
                                       <p:cBhvr>
-                                        <p:cTn id="30" dur="500"/>
+                                        <p:cTn id="37" dur="500"/>
                                         <p:tgtEl>
                                           <p:spTgt spid="17"/>
-                                        </p:tgtEl>
-                                      </p:cBhvr>
-                                    </p:animEffect>
-                                  </p:childTnLst>
-                                </p:cTn>
-                              </p:par>
-                              <p:par>
-                                <p:cTn id="31" presetID="10" presetClass="entr" presetSubtype="0" fill="hold" grpId="0" nodeType="withEffect">
-                                  <p:stCondLst>
-                                    <p:cond delay="0"/>
-                                  </p:stCondLst>
-                                  <p:childTnLst>
-                                    <p:set>
-                                      <p:cBhvr>
-                                        <p:cTn id="32" dur="1" fill="hold">
-                                          <p:stCondLst>
-                                            <p:cond delay="0"/>
-                                          </p:stCondLst>
-                                        </p:cTn>
-                                        <p:tgtEl>
-                                          <p:spTgt spid="18"/>
-                                        </p:tgtEl>
-                                        <p:attrNameLst>
-                                          <p:attrName>style.visibility</p:attrName>
-                                        </p:attrNameLst>
-                                      </p:cBhvr>
-                                      <p:to>
-                                        <p:strVal val="visible"/>
-                                      </p:to>
-                                    </p:set>
-                                    <p:animEffect transition="in" filter="fade">
-                                      <p:cBhvr>
-                                        <p:cTn id="33" dur="500"/>
-                                        <p:tgtEl>
-                                          <p:spTgt spid="18"/>
                                         </p:tgtEl>
                                       </p:cBhvr>
                                     </p:animEffect>
@@ -8042,26 +8147,61 @@
                     </p:cTn>
                   </p:par>
                   <p:par>
-                    <p:cTn id="34" fill="hold">
+                    <p:cTn id="38" fill="hold">
                       <p:stCondLst>
                         <p:cond delay="indefinite"/>
                       </p:stCondLst>
                       <p:childTnLst>
                         <p:par>
-                          <p:cTn id="35" fill="hold">
+                          <p:cTn id="39" fill="hold">
                             <p:stCondLst>
                               <p:cond delay="0"/>
                             </p:stCondLst>
                             <p:childTnLst>
                               <p:par>
-                                <p:cTn id="36" presetID="10" presetClass="entr" presetSubtype="0" fill="hold" grpId="0" nodeType="clickEffect">
+                                <p:cTn id="40" presetID="10" presetClass="entr" presetSubtype="0" fill="hold" grpId="0" nodeType="clickEffect">
                                   <p:stCondLst>
                                     <p:cond delay="0"/>
                                   </p:stCondLst>
                                   <p:childTnLst>
                                     <p:set>
                                       <p:cBhvr>
-                                        <p:cTn id="37" dur="1" fill="hold">
+                                        <p:cTn id="41" dur="1" fill="hold">
+                                          <p:stCondLst>
+                                            <p:cond delay="0"/>
+                                          </p:stCondLst>
+                                        </p:cTn>
+                                        <p:tgtEl>
+                                          <p:spTgt spid="20"/>
+                                        </p:tgtEl>
+                                        <p:attrNameLst>
+                                          <p:attrName>style.visibility</p:attrName>
+                                        </p:attrNameLst>
+                                      </p:cBhvr>
+                                      <p:to>
+                                        <p:strVal val="visible"/>
+                                      </p:to>
+                                    </p:set>
+                                    <p:animEffect transition="in" filter="fade">
+                                      <p:cBhvr>
+                                        <p:cTn id="42" dur="500"/>
+                                        <p:tgtEl>
+                                          <p:spTgt spid="20"/>
+                                        </p:tgtEl>
+                                      </p:cBhvr>
+                                    </p:animEffect>
+                                  </p:childTnLst>
+                                </p:cTn>
+                              </p:par>
+                              <p:par>
+                                <p:cTn id="43" presetID="10" presetClass="entr" presetSubtype="0" fill="hold" grpId="0" nodeType="withEffect">
+                                  <p:stCondLst>
+                                    <p:cond delay="0"/>
+                                  </p:stCondLst>
+                                  <p:childTnLst>
+                                    <p:set>
+                                      <p:cBhvr>
+                                        <p:cTn id="44" dur="1" fill="hold">
                                           <p:stCondLst>
                                             <p:cond delay="0"/>
                                           </p:stCondLst>
@@ -8079,44 +8219,9 @@
                                     </p:set>
                                     <p:animEffect transition="in" filter="fade">
                                       <p:cBhvr>
-                                        <p:cTn id="38" dur="500"/>
+                                        <p:cTn id="45" dur="500"/>
                                         <p:tgtEl>
                                           <p:spTgt spid="19"/>
-                                        </p:tgtEl>
-                                      </p:cBhvr>
-                                    </p:animEffect>
-                                  </p:childTnLst>
-                                </p:cTn>
-                              </p:par>
-                              <p:par>
-                                <p:cTn id="39" presetID="10" presetClass="entr" presetSubtype="0" fill="hold" grpId="0" nodeType="withEffect">
-                                  <p:stCondLst>
-                                    <p:cond delay="0"/>
-                                  </p:stCondLst>
-                                  <p:childTnLst>
-                                    <p:set>
-                                      <p:cBhvr>
-                                        <p:cTn id="40" dur="1" fill="hold">
-                                          <p:stCondLst>
-                                            <p:cond delay="0"/>
-                                          </p:stCondLst>
-                                        </p:cTn>
-                                        <p:tgtEl>
-                                          <p:spTgt spid="20"/>
-                                        </p:tgtEl>
-                                        <p:attrNameLst>
-                                          <p:attrName>style.visibility</p:attrName>
-                                        </p:attrNameLst>
-                                      </p:cBhvr>
-                                      <p:to>
-                                        <p:strVal val="visible"/>
-                                      </p:to>
-                                    </p:set>
-                                    <p:animEffect transition="in" filter="fade">
-                                      <p:cBhvr>
-                                        <p:cTn id="41" dur="500"/>
-                                        <p:tgtEl>
-                                          <p:spTgt spid="20"/>
                                         </p:tgtEl>
                                       </p:cBhvr>
                                     </p:animEffect>
@@ -11354,7 +11459,7 @@
                             </p:stCondLst>
                             <p:childTnLst>
                               <p:par>
-                                <p:cTn id="5" presetID="10" presetClass="entr" presetSubtype="0" fill="hold" grpId="0" nodeType="clickEffect">
+                                <p:cTn id="5" presetID="1" presetClass="entr" presetSubtype="0" fill="hold" grpId="0" nodeType="clickEffect">
                                   <p:stCondLst>
                                     <p:cond delay="0"/>
                                   </p:stCondLst>
@@ -11362,6 +11467,51 @@
                                     <p:set>
                                       <p:cBhvr>
                                         <p:cTn id="6" dur="1" fill="hold">
+                                          <p:stCondLst>
+                                            <p:cond delay="0"/>
+                                          </p:stCondLst>
+                                        </p:cTn>
+                                        <p:tgtEl>
+                                          <p:spTgt spid="5"/>
+                                        </p:tgtEl>
+                                        <p:attrNameLst>
+                                          <p:attrName>style.visibility</p:attrName>
+                                        </p:attrNameLst>
+                                      </p:cBhvr>
+                                      <p:to>
+                                        <p:strVal val="visible"/>
+                                      </p:to>
+                                    </p:set>
+                                  </p:childTnLst>
+                                </p:cTn>
+                              </p:par>
+                            </p:childTnLst>
+                          </p:cTn>
+                        </p:par>
+                      </p:childTnLst>
+                    </p:cTn>
+                  </p:par>
+                  <p:par>
+                    <p:cTn id="7" fill="hold">
+                      <p:stCondLst>
+                        <p:cond delay="indefinite"/>
+                      </p:stCondLst>
+                      <p:childTnLst>
+                        <p:par>
+                          <p:cTn id="8" fill="hold">
+                            <p:stCondLst>
+                              <p:cond delay="0"/>
+                            </p:stCondLst>
+                            <p:childTnLst>
+                              <p:par>
+                                <p:cTn id="9" presetID="10" presetClass="entr" presetSubtype="0" fill="hold" grpId="0" nodeType="clickEffect">
+                                  <p:stCondLst>
+                                    <p:cond delay="0"/>
+                                  </p:stCondLst>
+                                  <p:childTnLst>
+                                    <p:set>
+                                      <p:cBhvr>
+                                        <p:cTn id="10" dur="1" fill="hold">
                                           <p:stCondLst>
                                             <p:cond delay="0"/>
                                           </p:stCondLst>
@@ -11379,7 +11529,7 @@
                                     </p:set>
                                     <p:animEffect transition="in" filter="fade">
                                       <p:cBhvr>
-                                        <p:cTn id="7" dur="500"/>
+                                        <p:cTn id="11" dur="500"/>
                                         <p:tgtEl>
                                           <p:spTgt spid="7"/>
                                         </p:tgtEl>
@@ -11395,26 +11545,71 @@
                     </p:cTn>
                   </p:par>
                   <p:par>
-                    <p:cTn id="8" fill="hold">
+                    <p:cTn id="12" fill="hold">
                       <p:stCondLst>
                         <p:cond delay="indefinite"/>
                       </p:stCondLst>
                       <p:childTnLst>
                         <p:par>
-                          <p:cTn id="9" fill="hold">
+                          <p:cTn id="13" fill="hold">
                             <p:stCondLst>
                               <p:cond delay="0"/>
                             </p:stCondLst>
                             <p:childTnLst>
                               <p:par>
-                                <p:cTn id="10" presetID="10" presetClass="entr" presetSubtype="0" fill="hold" grpId="0" nodeType="clickEffect">
+                                <p:cTn id="14" presetID="1" presetClass="entr" presetSubtype="0" fill="hold" nodeType="clickEffect">
                                   <p:stCondLst>
                                     <p:cond delay="0"/>
                                   </p:stCondLst>
                                   <p:childTnLst>
                                     <p:set>
                                       <p:cBhvr>
-                                        <p:cTn id="11" dur="1" fill="hold">
+                                        <p:cTn id="15" dur="1" fill="hold">
+                                          <p:stCondLst>
+                                            <p:cond delay="0"/>
+                                          </p:stCondLst>
+                                        </p:cTn>
+                                        <p:tgtEl>
+                                          <p:spTgt spid="11"/>
+                                        </p:tgtEl>
+                                        <p:attrNameLst>
+                                          <p:attrName>style.visibility</p:attrName>
+                                        </p:attrNameLst>
+                                      </p:cBhvr>
+                                      <p:to>
+                                        <p:strVal val="visible"/>
+                                      </p:to>
+                                    </p:set>
+                                  </p:childTnLst>
+                                </p:cTn>
+                              </p:par>
+                            </p:childTnLst>
+                          </p:cTn>
+                        </p:par>
+                      </p:childTnLst>
+                    </p:cTn>
+                  </p:par>
+                  <p:par>
+                    <p:cTn id="16" fill="hold">
+                      <p:stCondLst>
+                        <p:cond delay="indefinite"/>
+                      </p:stCondLst>
+                      <p:childTnLst>
+                        <p:par>
+                          <p:cTn id="17" fill="hold">
+                            <p:stCondLst>
+                              <p:cond delay="0"/>
+                            </p:stCondLst>
+                            <p:childTnLst>
+                              <p:par>
+                                <p:cTn id="18" presetID="10" presetClass="entr" presetSubtype="0" fill="hold" grpId="0" nodeType="clickEffect">
+                                  <p:stCondLst>
+                                    <p:cond delay="0"/>
+                                  </p:stCondLst>
+                                  <p:childTnLst>
+                                    <p:set>
+                                      <p:cBhvr>
+                                        <p:cTn id="19" dur="1" fill="hold">
                                           <p:stCondLst>
                                             <p:cond delay="0"/>
                                           </p:stCondLst>
@@ -11432,12 +11627,39 @@
                                     </p:set>
                                     <p:animEffect transition="in" filter="fade">
                                       <p:cBhvr>
-                                        <p:cTn id="12" dur="500"/>
+                                        <p:cTn id="20" dur="500"/>
                                         <p:tgtEl>
                                           <p:spTgt spid="8"/>
                                         </p:tgtEl>
                                       </p:cBhvr>
                                     </p:animEffect>
+                                  </p:childTnLst>
+                                </p:cTn>
+                              </p:par>
+                              <p:par>
+                                <p:cTn id="21" presetID="1" presetClass="entr" presetSubtype="0" fill="hold" nodeType="withEffect">
+                                  <p:stCondLst>
+                                    <p:cond delay="0"/>
+                                  </p:stCondLst>
+                                  <p:childTnLst>
+                                    <p:set>
+                                      <p:cBhvr>
+                                        <p:cTn id="22" dur="1" fill="hold">
+                                          <p:stCondLst>
+                                            <p:cond delay="0"/>
+                                          </p:stCondLst>
+                                        </p:cTn>
+                                        <p:tgtEl>
+                                          <p:spTgt spid="9"/>
+                                        </p:tgtEl>
+                                        <p:attrNameLst>
+                                          <p:attrName>style.visibility</p:attrName>
+                                        </p:attrNameLst>
+                                      </p:cBhvr>
+                                      <p:to>
+                                        <p:strVal val="visible"/>
+                                      </p:to>
+                                    </p:set>
                                   </p:childTnLst>
                                 </p:cTn>
                               </p:par>
@@ -11469,6 +11691,7 @@
       </p:par>
     </p:tnLst>
     <p:bldLst>
+      <p:bldP spid="5" grpId="0"/>
       <p:bldP spid="7" grpId="0"/>
       <p:bldP spid="8" grpId="0"/>
     </p:bldLst>
@@ -11831,6 +12054,59 @@
           </a:p>
         </p:txBody>
       </p:sp>
+      <p:sp>
+        <p:nvSpPr>
+          <p:cNvPr id="5" name="CasellaDiTesto 4">
+            <a:extLst>
+              <a:ext uri="{FF2B5EF4-FFF2-40B4-BE49-F238E27FC236}">
+                <a16:creationId xmlns:a16="http://schemas.microsoft.com/office/drawing/2014/main" id="{B2EBA13B-77CC-46C8-A031-3F2EEDA8783A}"/>
+              </a:ext>
+            </a:extLst>
+          </p:cNvPr>
+          <p:cNvSpPr txBox="1"/>
+          <p:nvPr/>
+        </p:nvSpPr>
+        <p:spPr>
+          <a:xfrm>
+            <a:off x="7077227" y="947583"/>
+            <a:ext cx="1023165" cy="646331"/>
+          </a:xfrm>
+          <a:prstGeom prst="rect">
+            <a:avLst/>
+          </a:prstGeom>
+          <a:noFill/>
+        </p:spPr>
+        <p:txBody>
+          <a:bodyPr wrap="none" rtlCol="0">
+            <a:spAutoFit/>
+          </a:bodyPr>
+          <a:lstStyle/>
+          <a:p>
+            <a:r>
+              <a:rPr lang="it-IT" sz="1200" dirty="0">
+                <a:latin typeface="+mj-lt"/>
+              </a:rPr>
+              <a:t>Asse rosso: x</a:t>
+            </a:r>
+          </a:p>
+          <a:p>
+            <a:r>
+              <a:rPr lang="it-IT" sz="1200" dirty="0">
+                <a:latin typeface="+mj-lt"/>
+              </a:rPr>
+              <a:t>Asse verde: y</a:t>
+            </a:r>
+          </a:p>
+          <a:p>
+            <a:r>
+              <a:rPr lang="it-IT" sz="1200" dirty="0">
+                <a:latin typeface="+mj-lt"/>
+              </a:rPr>
+              <a:t>Asse blu: z</a:t>
+            </a:r>
+          </a:p>
+        </p:txBody>
+      </p:sp>
     </p:spTree>
     <p:extLst>
       <p:ext uri="{BB962C8B-B14F-4D97-AF65-F5344CB8AC3E}">
@@ -11869,6 +12145,254 @@
           <a:chExt cx="0" cy="0"/>
         </a:xfrm>
       </p:grpSpPr>
+      <mc:AlternateContent xmlns:mc="http://schemas.openxmlformats.org/markup-compatibility/2006">
+        <mc:Choice xmlns:a14="http://schemas.microsoft.com/office/drawing/2010/main" Requires="a14">
+          <p:sp>
+            <p:nvSpPr>
+              <p:cNvPr id="2" name="CasellaDiTesto 1">
+                <a:extLst>
+                  <a:ext uri="{FF2B5EF4-FFF2-40B4-BE49-F238E27FC236}">
+                    <a16:creationId xmlns:a16="http://schemas.microsoft.com/office/drawing/2014/main" id="{A0D92B2F-B13E-4DB4-90FF-559E304D0272}"/>
+                  </a:ext>
+                </a:extLst>
+              </p:cNvPr>
+              <p:cNvSpPr txBox="1"/>
+              <p:nvPr/>
+            </p:nvSpPr>
+            <p:spPr>
+              <a:xfrm>
+                <a:off x="683568" y="1180661"/>
+                <a:ext cx="7488832" cy="1754326"/>
+              </a:xfrm>
+              <a:prstGeom prst="rect">
+                <a:avLst/>
+              </a:prstGeom>
+              <a:noFill/>
+            </p:spPr>
+            <p:txBody>
+              <a:bodyPr wrap="square" rtlCol="0">
+                <a:spAutoFit/>
+              </a:bodyPr>
+              <a:lstStyle/>
+              <a:p>
+                <a:r>
+                  <a:rPr lang="it-IT" dirty="0">
+                    <a:latin typeface="+mj-lt"/>
+                  </a:rPr>
+                  <a:t>Siamo quindi interessati a definire posizione e orientamento di una terna,</a:t>
+                </a:r>
+              </a:p>
+              <a:p>
+                <a:r>
+                  <a:rPr lang="it-IT" dirty="0">
+                    <a:latin typeface="+mj-lt"/>
+                  </a:rPr>
+                  <a:t> per poter definire così </a:t>
+                </a:r>
+              </a:p>
+              <a:p>
+                <a:pPr marL="285750" indent="-285750">
+                  <a:buFontTx/>
+                  <a:buChar char="-"/>
+                </a:pPr>
+                <a:r>
+                  <a:rPr lang="it-IT" dirty="0">
+                    <a:latin typeface="+mj-lt"/>
+                  </a:rPr>
+                  <a:t>Posizione: banalmente individuata dalle coordinate </a:t>
+                </a:r>
+                <a14:m>
+                  <m:oMath xmlns:m="http://schemas.openxmlformats.org/officeDocument/2006/math">
+                    <m:r>
+                      <a:rPr lang="it-IT" b="0" i="1" smtClean="0">
+                        <a:latin typeface="+mj-lt"/>
+                      </a:rPr>
+                      <m:t>(</m:t>
+                    </m:r>
+                    <m:r>
+                      <a:rPr lang="it-IT" b="0" i="1" smtClean="0">
+                        <a:latin typeface="+mj-lt"/>
+                      </a:rPr>
+                      <m:t>𝑥</m:t>
+                    </m:r>
+                    <m:r>
+                      <a:rPr lang="it-IT" b="0" i="1" smtClean="0">
+                        <a:latin typeface="+mj-lt"/>
+                      </a:rPr>
+                      <m:t>,</m:t>
+                    </m:r>
+                    <m:r>
+                      <a:rPr lang="it-IT" b="0" i="1" smtClean="0">
+                        <a:latin typeface="+mj-lt"/>
+                      </a:rPr>
+                      <m:t>𝑦</m:t>
+                    </m:r>
+                    <m:r>
+                      <a:rPr lang="it-IT" b="0" i="1" smtClean="0">
+                        <a:latin typeface="+mj-lt"/>
+                      </a:rPr>
+                      <m:t>,</m:t>
+                    </m:r>
+                    <m:r>
+                      <a:rPr lang="it-IT" b="0" i="1" smtClean="0">
+                        <a:latin typeface="+mj-lt"/>
+                      </a:rPr>
+                      <m:t>𝑧</m:t>
+                    </m:r>
+                    <m:r>
+                      <a:rPr lang="it-IT" b="0" i="1" smtClean="0">
+                        <a:latin typeface="+mj-lt"/>
+                      </a:rPr>
+                      <m:t>)</m:t>
+                    </m:r>
+                  </m:oMath>
+                </a14:m>
+                <a:r>
+                  <a:rPr lang="it-IT" dirty="0">
+                    <a:latin typeface="+mj-lt"/>
+                  </a:rPr>
+                  <a:t> dell’origine del sistema di riferimento.</a:t>
+                </a:r>
+              </a:p>
+              <a:p>
+                <a:pPr marL="285750" indent="-285750">
+                  <a:buFontTx/>
+                  <a:buChar char="-"/>
+                </a:pPr>
+                <a:r>
+                  <a:rPr lang="it-IT" dirty="0">
+                    <a:latin typeface="+mj-lt"/>
+                  </a:rPr>
+                  <a:t>Orientamento: è necessario definire l’orientamento di una terna rispetto ad un’altra assunta come riferimento.</a:t>
+                </a:r>
+              </a:p>
+            </p:txBody>
+          </p:sp>
+        </mc:Choice>
+        <mc:Fallback>
+          <p:sp>
+            <p:nvSpPr>
+              <p:cNvPr id="2" name="CasellaDiTesto 1">
+                <a:extLst>
+                  <a:ext uri="{FF2B5EF4-FFF2-40B4-BE49-F238E27FC236}">
+                    <a16:creationId xmlns:a16="http://schemas.microsoft.com/office/drawing/2014/main" id="{A0D92B2F-B13E-4DB4-90FF-559E304D0272}"/>
+                  </a:ext>
+                </a:extLst>
+              </p:cNvPr>
+              <p:cNvSpPr txBox="1">
+                <a:spLocks noRot="1" noChangeAspect="1" noMove="1" noResize="1" noEditPoints="1" noAdjustHandles="1" noChangeArrowheads="1" noChangeShapeType="1" noTextEdit="1"/>
+              </p:cNvSpPr>
+              <p:nvPr/>
+            </p:nvSpPr>
+            <p:spPr>
+              <a:xfrm>
+                <a:off x="683568" y="1180661"/>
+                <a:ext cx="7488832" cy="1754326"/>
+              </a:xfrm>
+              <a:prstGeom prst="rect">
+                <a:avLst/>
+              </a:prstGeom>
+              <a:blipFill>
+                <a:blip r:embed="rId2"/>
+                <a:stretch>
+                  <a:fillRect l="-895" t="-1742" b="-5226"/>
+                </a:stretch>
+              </a:blipFill>
+            </p:spPr>
+            <p:txBody>
+              <a:bodyPr/>
+              <a:lstStyle/>
+              <a:p>
+                <a:r>
+                  <a:rPr lang="it-IT">
+                    <a:noFill/>
+                  </a:rPr>
+                  <a:t> </a:t>
+                </a:r>
+              </a:p>
+            </p:txBody>
+          </p:sp>
+        </mc:Fallback>
+      </mc:AlternateContent>
+      <p:cxnSp>
+        <p:nvCxnSpPr>
+          <p:cNvPr id="4" name="Connettore 2 3">
+            <a:extLst>
+              <a:ext uri="{FF2B5EF4-FFF2-40B4-BE49-F238E27FC236}">
+                <a16:creationId xmlns:a16="http://schemas.microsoft.com/office/drawing/2014/main" id="{343FEF3B-5484-4170-A94B-E2535BFC821D}"/>
+              </a:ext>
+            </a:extLst>
+          </p:cNvPr>
+          <p:cNvCxnSpPr/>
+          <p:nvPr/>
+        </p:nvCxnSpPr>
+        <p:spPr>
+          <a:xfrm>
+            <a:off x="4283968" y="3245956"/>
+            <a:ext cx="0" cy="621938"/>
+          </a:xfrm>
+          <a:prstGeom prst="straightConnector1">
+            <a:avLst/>
+          </a:prstGeom>
+          <a:ln w="38100">
+            <a:solidFill>
+              <a:schemeClr val="tx1"/>
+            </a:solidFill>
+            <a:tailEnd type="triangle"/>
+          </a:ln>
+        </p:spPr>
+        <p:style>
+          <a:lnRef idx="1">
+            <a:schemeClr val="accent1"/>
+          </a:lnRef>
+          <a:fillRef idx="0">
+            <a:schemeClr val="accent1"/>
+          </a:fillRef>
+          <a:effectRef idx="0">
+            <a:schemeClr val="accent1"/>
+          </a:effectRef>
+          <a:fontRef idx="minor">
+            <a:schemeClr val="tx1"/>
+          </a:fontRef>
+        </p:style>
+      </p:cxnSp>
+      <p:sp>
+        <p:nvSpPr>
+          <p:cNvPr id="5" name="CasellaDiTesto 4">
+            <a:extLst>
+              <a:ext uri="{FF2B5EF4-FFF2-40B4-BE49-F238E27FC236}">
+                <a16:creationId xmlns:a16="http://schemas.microsoft.com/office/drawing/2014/main" id="{F4BEFCAF-5F99-431F-97C3-CD17F82E9741}"/>
+              </a:ext>
+            </a:extLst>
+          </p:cNvPr>
+          <p:cNvSpPr txBox="1"/>
+          <p:nvPr/>
+        </p:nvSpPr>
+        <p:spPr>
+          <a:xfrm>
+            <a:off x="3122304" y="3854904"/>
+            <a:ext cx="2323328" cy="461665"/>
+          </a:xfrm>
+          <a:prstGeom prst="rect">
+            <a:avLst/>
+          </a:prstGeom>
+          <a:noFill/>
+        </p:spPr>
+        <p:txBody>
+          <a:bodyPr wrap="none" rtlCol="0">
+            <a:spAutoFit/>
+          </a:bodyPr>
+          <a:lstStyle/>
+          <a:p>
+            <a:r>
+              <a:rPr lang="it-IT" sz="2400" b="1" dirty="0">
+                <a:latin typeface="+mj-lt"/>
+              </a:rPr>
+              <a:t>Ma come fare?!?</a:t>
+            </a:r>
+          </a:p>
+        </p:txBody>
+      </p:sp>
     </p:spTree>
     <p:extLst>
       <p:ext uri="{BB962C8B-B14F-4D97-AF65-F5344CB8AC3E}">
@@ -11907,6 +12431,203 @@
           <a:chExt cx="0" cy="0"/>
         </a:xfrm>
       </p:grpSpPr>
+      <p:pic>
+        <p:nvPicPr>
+          <p:cNvPr id="3" name="Immagine 2">
+            <a:extLst>
+              <a:ext uri="{FF2B5EF4-FFF2-40B4-BE49-F238E27FC236}">
+                <a16:creationId xmlns:a16="http://schemas.microsoft.com/office/drawing/2014/main" id="{5B72007C-C74D-4858-955C-5CAC14100555}"/>
+              </a:ext>
+            </a:extLst>
+          </p:cNvPr>
+          <p:cNvPicPr>
+            <a:picLocks noChangeAspect="1"/>
+          </p:cNvPicPr>
+          <p:nvPr/>
+        </p:nvPicPr>
+        <p:blipFill>
+          <a:blip r:embed="rId2"/>
+          <a:stretch>
+            <a:fillRect/>
+          </a:stretch>
+        </p:blipFill>
+        <p:spPr>
+          <a:xfrm>
+            <a:off x="683568" y="1137518"/>
+            <a:ext cx="3746082" cy="2031326"/>
+          </a:xfrm>
+          <a:prstGeom prst="rect">
+            <a:avLst/>
+          </a:prstGeom>
+        </p:spPr>
+      </p:pic>
+      <p:sp>
+        <p:nvSpPr>
+          <p:cNvPr id="2" name="CasellaDiTesto 1">
+            <a:extLst>
+              <a:ext uri="{FF2B5EF4-FFF2-40B4-BE49-F238E27FC236}">
+                <a16:creationId xmlns:a16="http://schemas.microsoft.com/office/drawing/2014/main" id="{2060125A-978C-4654-BD91-7FFDC7386A86}"/>
+              </a:ext>
+            </a:extLst>
+          </p:cNvPr>
+          <p:cNvSpPr txBox="1"/>
+          <p:nvPr/>
+        </p:nvSpPr>
+        <p:spPr>
+          <a:xfrm>
+            <a:off x="683568" y="411510"/>
+            <a:ext cx="3259226" cy="523220"/>
+          </a:xfrm>
+          <a:prstGeom prst="rect">
+            <a:avLst/>
+          </a:prstGeom>
+          <a:noFill/>
+        </p:spPr>
+        <p:txBody>
+          <a:bodyPr wrap="none" rtlCol="0">
+            <a:spAutoFit/>
+          </a:bodyPr>
+          <a:lstStyle/>
+          <a:p>
+            <a:r>
+              <a:rPr lang="it-IT" sz="2800" b="1" dirty="0">
+                <a:latin typeface="+mj-lt"/>
+              </a:rPr>
+              <a:t>Rotazioni elementari</a:t>
+            </a:r>
+          </a:p>
+        </p:txBody>
+      </p:sp>
+      <p:grpSp>
+        <p:nvGrpSpPr>
+          <p:cNvPr id="7" name="Gruppo 6">
+            <a:extLst>
+              <a:ext uri="{FF2B5EF4-FFF2-40B4-BE49-F238E27FC236}">
+                <a16:creationId xmlns:a16="http://schemas.microsoft.com/office/drawing/2014/main" id="{61856CEB-E523-4E64-8DC7-F08CA9C8D1B7}"/>
+              </a:ext>
+            </a:extLst>
+          </p:cNvPr>
+          <p:cNvGrpSpPr/>
+          <p:nvPr/>
+        </p:nvGrpSpPr>
+        <p:grpSpPr>
+          <a:xfrm>
+            <a:off x="4380679" y="1858153"/>
+            <a:ext cx="4415090" cy="2308324"/>
+            <a:chOff x="4380679" y="1858153"/>
+            <a:chExt cx="4415090" cy="2308324"/>
+          </a:xfrm>
+        </p:grpSpPr>
+        <p:sp>
+          <p:nvSpPr>
+            <p:cNvPr id="4" name="CasellaDiTesto 3">
+              <a:extLst>
+                <a:ext uri="{FF2B5EF4-FFF2-40B4-BE49-F238E27FC236}">
+                  <a16:creationId xmlns:a16="http://schemas.microsoft.com/office/drawing/2014/main" id="{91B18E7D-D076-4C17-95A0-B1554AAF6A69}"/>
+                </a:ext>
+              </a:extLst>
+            </p:cNvPr>
+            <p:cNvSpPr txBox="1"/>
+            <p:nvPr/>
+          </p:nvSpPr>
+          <p:spPr>
+            <a:xfrm>
+              <a:off x="4380679" y="1858153"/>
+              <a:ext cx="4415090" cy="2308324"/>
+            </a:xfrm>
+            <a:prstGeom prst="rect">
+              <a:avLst/>
+            </a:prstGeom>
+            <a:noFill/>
+          </p:spPr>
+          <p:txBody>
+            <a:bodyPr wrap="square" rtlCol="0">
+              <a:spAutoFit/>
+            </a:bodyPr>
+            <a:lstStyle/>
+            <a:p>
+              <a:r>
+                <a:rPr lang="it-IT" dirty="0">
+                  <a:latin typeface="+mj-lt"/>
+                </a:rPr>
+                <a:t>In sostanza andando a far coincidere le origini delle due</a:t>
+              </a:r>
+              <a:br>
+                <a:rPr lang="it-IT" dirty="0">
+                  <a:latin typeface="+mj-lt"/>
+                </a:rPr>
+              </a:br>
+              <a:r>
+                <a:rPr lang="it-IT" dirty="0">
+                  <a:latin typeface="+mj-lt"/>
+                </a:rPr>
+                <a:t>terne, ovvero operando una traslazione della seconda terna rispetto alle prima,</a:t>
+              </a:r>
+              <a:br>
+                <a:rPr lang="it-IT" dirty="0">
+                  <a:latin typeface="+mj-lt"/>
+                </a:rPr>
+              </a:br>
+              <a:r>
+                <a:rPr lang="it-IT" dirty="0">
+                  <a:latin typeface="+mj-lt"/>
+                </a:rPr>
+                <a:t>possiamo vedere i versori dei tre assi traslati come tre vettori separati, i quali</a:t>
+              </a:r>
+              <a:br>
+                <a:rPr lang="it-IT" dirty="0">
+                  <a:latin typeface="+mj-lt"/>
+                </a:rPr>
+              </a:br>
+              <a:r>
+                <a:rPr lang="it-IT" dirty="0">
+                  <a:latin typeface="+mj-lt"/>
+                </a:rPr>
+                <a:t>possono quindi essere espressi rispettivamente come…</a:t>
+              </a:r>
+            </a:p>
+          </p:txBody>
+        </p:sp>
+        <p:cxnSp>
+          <p:nvCxnSpPr>
+            <p:cNvPr id="6" name="Connettore 2 5">
+              <a:extLst>
+                <a:ext uri="{FF2B5EF4-FFF2-40B4-BE49-F238E27FC236}">
+                  <a16:creationId xmlns:a16="http://schemas.microsoft.com/office/drawing/2014/main" id="{AC546FAC-F01D-4A0F-80A8-FB6580706E9D}"/>
+                </a:ext>
+              </a:extLst>
+            </p:cNvPr>
+            <p:cNvCxnSpPr/>
+            <p:nvPr/>
+          </p:nvCxnSpPr>
+          <p:spPr>
+            <a:xfrm>
+              <a:off x="6732240" y="3939902"/>
+              <a:ext cx="360040" cy="0"/>
+            </a:xfrm>
+            <a:prstGeom prst="straightConnector1">
+              <a:avLst/>
+            </a:prstGeom>
+            <a:ln w="38100">
+              <a:tailEnd type="triangle"/>
+            </a:ln>
+          </p:spPr>
+          <p:style>
+            <a:lnRef idx="1">
+              <a:schemeClr val="dk1"/>
+            </a:lnRef>
+            <a:fillRef idx="0">
+              <a:schemeClr val="dk1"/>
+            </a:fillRef>
+            <a:effectRef idx="0">
+              <a:schemeClr val="dk1"/>
+            </a:effectRef>
+            <a:fontRef idx="minor">
+              <a:schemeClr val="tx1"/>
+            </a:fontRef>
+          </p:style>
+        </p:cxnSp>
+      </p:grpSp>
     </p:spTree>
     <p:extLst>
       <p:ext uri="{BB962C8B-B14F-4D97-AF65-F5344CB8AC3E}">
@@ -11945,6 +12666,611 @@
           <a:chExt cx="0" cy="0"/>
         </a:xfrm>
       </p:grpSpPr>
+      <mc:AlternateContent xmlns:mc="http://schemas.openxmlformats.org/markup-compatibility/2006">
+        <mc:Choice xmlns:a14="http://schemas.microsoft.com/office/drawing/2010/main" Requires="a14">
+          <p:sp>
+            <p:nvSpPr>
+              <p:cNvPr id="2" name="CasellaDiTesto 1">
+                <a:extLst>
+                  <a:ext uri="{FF2B5EF4-FFF2-40B4-BE49-F238E27FC236}">
+                    <a16:creationId xmlns:a16="http://schemas.microsoft.com/office/drawing/2014/main" id="{088AE33C-2FC4-40BF-AD2E-0281C7FB534C}"/>
+                  </a:ext>
+                </a:extLst>
+              </p:cNvPr>
+              <p:cNvSpPr txBox="1"/>
+              <p:nvPr/>
+            </p:nvSpPr>
+            <p:spPr>
+              <a:xfrm>
+                <a:off x="1018783" y="1556087"/>
+                <a:ext cx="7277954" cy="2031325"/>
+              </a:xfrm>
+              <a:prstGeom prst="rect">
+                <a:avLst/>
+              </a:prstGeom>
+              <a:noFill/>
+            </p:spPr>
+            <p:txBody>
+              <a:bodyPr wrap="none" rtlCol="0">
+                <a:spAutoFit/>
+              </a:bodyPr>
+              <a:lstStyle/>
+              <a:p>
+                <a:pPr marL="285750" indent="-285750">
+                  <a:buFontTx/>
+                  <a:buChar char="-"/>
+                </a:pPr>
+                <a14:m>
+                  <m:oMath xmlns:m="http://schemas.openxmlformats.org/officeDocument/2006/math">
+                    <m:acc>
+                      <m:accPr>
+                        <m:chr m:val="̂"/>
+                        <m:ctrlPr>
+                          <a:rPr lang="it-IT" b="1" i="1" smtClean="0">
+                            <a:latin typeface="+mj-lt"/>
+                          </a:rPr>
+                        </m:ctrlPr>
+                      </m:accPr>
+                      <m:e>
+                        <m:r>
+                          <a:rPr lang="it-IT" b="1" i="1" smtClean="0">
+                            <a:latin typeface="+mj-lt"/>
+                          </a:rPr>
+                          <m:t>𝒙</m:t>
+                        </m:r>
+                      </m:e>
+                    </m:acc>
+                    <m:r>
+                      <a:rPr lang="it-IT" b="1" i="1" smtClean="0">
+                        <a:latin typeface="+mj-lt"/>
+                      </a:rPr>
+                      <m:t>=</m:t>
+                    </m:r>
+                    <m:d>
+                      <m:dPr>
+                        <m:ctrlPr>
+                          <a:rPr lang="it-IT" b="1" i="1" smtClean="0">
+                            <a:latin typeface="+mj-lt"/>
+                          </a:rPr>
+                        </m:ctrlPr>
+                      </m:dPr>
+                      <m:e>
+                        <m:sSub>
+                          <m:sSubPr>
+                            <m:ctrlPr>
+                              <a:rPr lang="it-IT" b="1" i="1" smtClean="0">
+                                <a:latin typeface="+mj-lt"/>
+                              </a:rPr>
+                            </m:ctrlPr>
+                          </m:sSubPr>
+                          <m:e>
+                            <m:r>
+                              <a:rPr lang="it-IT" b="1" i="1" smtClean="0">
+                                <a:latin typeface="+mj-lt"/>
+                              </a:rPr>
+                              <m:t>𝒙</m:t>
+                            </m:r>
+                          </m:e>
+                          <m:sub>
+                            <m:r>
+                              <a:rPr lang="it-IT" b="1" i="1" smtClean="0">
+                                <a:latin typeface="+mj-lt"/>
+                              </a:rPr>
+                              <m:t>𝟏</m:t>
+                            </m:r>
+                          </m:sub>
+                        </m:sSub>
+                        <m:r>
+                          <a:rPr lang="it-IT" b="1" i="1" smtClean="0">
+                            <a:latin typeface="+mj-lt"/>
+                          </a:rPr>
+                          <m:t>,</m:t>
+                        </m:r>
+                        <m:sSub>
+                          <m:sSubPr>
+                            <m:ctrlPr>
+                              <a:rPr lang="it-IT" b="1" i="1" smtClean="0">
+                                <a:latin typeface="+mj-lt"/>
+                              </a:rPr>
+                            </m:ctrlPr>
+                          </m:sSubPr>
+                          <m:e>
+                            <m:r>
+                              <a:rPr lang="it-IT" b="1" i="1" smtClean="0">
+                                <a:latin typeface="+mj-lt"/>
+                              </a:rPr>
+                              <m:t>𝒙</m:t>
+                            </m:r>
+                          </m:e>
+                          <m:sub>
+                            <m:r>
+                              <a:rPr lang="it-IT" b="1" i="1" smtClean="0">
+                                <a:latin typeface="+mj-lt"/>
+                              </a:rPr>
+                              <m:t>𝟐</m:t>
+                            </m:r>
+                          </m:sub>
+                        </m:sSub>
+                        <m:r>
+                          <a:rPr lang="it-IT" b="1" i="1" smtClean="0">
+                            <a:latin typeface="+mj-lt"/>
+                          </a:rPr>
+                          <m:t>,</m:t>
+                        </m:r>
+                        <m:sSub>
+                          <m:sSubPr>
+                            <m:ctrlPr>
+                              <a:rPr lang="it-IT" b="1" i="1" smtClean="0">
+                                <a:latin typeface="+mj-lt"/>
+                              </a:rPr>
+                            </m:ctrlPr>
+                          </m:sSubPr>
+                          <m:e>
+                            <m:r>
+                              <a:rPr lang="it-IT" b="1" i="1" smtClean="0">
+                                <a:latin typeface="+mj-lt"/>
+                              </a:rPr>
+                              <m:t>𝒙</m:t>
+                            </m:r>
+                          </m:e>
+                          <m:sub>
+                            <m:r>
+                              <a:rPr lang="it-IT" b="1" i="1" smtClean="0">
+                                <a:latin typeface="+mj-lt"/>
+                              </a:rPr>
+                              <m:t>𝟑</m:t>
+                            </m:r>
+                          </m:sub>
+                        </m:sSub>
+                      </m:e>
+                    </m:d>
+                    <m:r>
+                      <a:rPr lang="it-IT" b="1" i="0" smtClean="0">
+                        <a:latin typeface="+mj-lt"/>
+                      </a:rPr>
+                      <m:t>→</m:t>
+                    </m:r>
+                  </m:oMath>
+                </a14:m>
+                <a:r>
+                  <a:rPr lang="it-IT" b="1" dirty="0">
+                    <a:latin typeface="+mj-lt"/>
+                  </a:rPr>
+                  <a:t> </a:t>
+                </a:r>
+                <a:r>
+                  <a:rPr lang="it-IT" i="1" dirty="0">
+                    <a:latin typeface="+mj-lt"/>
+                  </a:rPr>
+                  <a:t> </a:t>
+                </a:r>
+                <a:r>
+                  <a:rPr lang="it-IT" dirty="0">
+                    <a:latin typeface="+mj-lt"/>
+                  </a:rPr>
+                  <a:t>Il versore direzionale dell’asse</a:t>
+                </a:r>
+                <a:br>
+                  <a:rPr lang="it-IT" dirty="0">
+                    <a:latin typeface="+mj-lt"/>
+                  </a:rPr>
+                </a:br>
+                <a:r>
+                  <a:rPr lang="it-IT" dirty="0">
+                    <a:latin typeface="+mj-lt"/>
+                  </a:rPr>
+                  <a:t>x presenta una componente </a:t>
+                </a:r>
+                <a:r>
+                  <a:rPr lang="it-IT" i="1" dirty="0">
+                    <a:latin typeface="+mj-lt"/>
+                  </a:rPr>
+                  <a:t>x</a:t>
+                </a:r>
+                <a:r>
+                  <a:rPr lang="it-IT" dirty="0">
+                    <a:latin typeface="+mj-lt"/>
+                  </a:rPr>
+                  <a:t>1 lungo l’asse x del sistema di riferimento</a:t>
+                </a:r>
+                <a:br>
+                  <a:rPr lang="it-IT" dirty="0">
+                    <a:latin typeface="+mj-lt"/>
+                  </a:rPr>
+                </a:br>
+                <a:r>
+                  <a:rPr lang="it-IT" dirty="0">
+                    <a:latin typeface="+mj-lt"/>
+                  </a:rPr>
+                  <a:t>considerabile </a:t>
+                </a:r>
+                <a:r>
+                  <a:rPr lang="it-IT" i="1" dirty="0">
+                    <a:latin typeface="+mj-lt"/>
+                  </a:rPr>
+                  <a:t>fisso</a:t>
+                </a:r>
+                <a:r>
+                  <a:rPr lang="it-IT" dirty="0">
+                    <a:latin typeface="+mj-lt"/>
+                  </a:rPr>
+                  <a:t>, </a:t>
+                </a:r>
+                <a:r>
+                  <a:rPr lang="it-IT" i="1" dirty="0">
+                    <a:latin typeface="+mj-lt"/>
+                  </a:rPr>
+                  <a:t>x</a:t>
+                </a:r>
+                <a:r>
+                  <a:rPr lang="it-IT" dirty="0">
+                    <a:latin typeface="+mj-lt"/>
+                  </a:rPr>
+                  <a:t>2 lungo y e </a:t>
+                </a:r>
+                <a:r>
+                  <a:rPr lang="it-IT" i="1" dirty="0">
+                    <a:latin typeface="+mj-lt"/>
+                  </a:rPr>
+                  <a:t>x</a:t>
+                </a:r>
+                <a:r>
+                  <a:rPr lang="it-IT" dirty="0">
+                    <a:latin typeface="+mj-lt"/>
+                  </a:rPr>
+                  <a:t>3 lungo z. </a:t>
+                </a:r>
+                <a:br>
+                  <a:rPr lang="it-IT" dirty="0">
+                    <a:latin typeface="+mj-lt"/>
+                  </a:rPr>
+                </a:br>
+                <a:r>
+                  <a:rPr lang="it-IT" b="1" dirty="0">
+                    <a:latin typeface="+mj-lt"/>
+                  </a:rPr>
+                  <a:t> </a:t>
+                </a:r>
+              </a:p>
+              <a:p>
+                <a:pPr marL="285750" indent="-285750">
+                  <a:buFontTx/>
+                  <a:buChar char="-"/>
+                </a:pPr>
+                <a14:m>
+                  <m:oMath xmlns:m="http://schemas.openxmlformats.org/officeDocument/2006/math">
+                    <m:acc>
+                      <m:accPr>
+                        <m:chr m:val="̂"/>
+                        <m:ctrlPr>
+                          <a:rPr lang="it-IT" b="1" i="1">
+                            <a:latin typeface="+mj-lt"/>
+                          </a:rPr>
+                        </m:ctrlPr>
+                      </m:accPr>
+                      <m:e>
+                        <m:r>
+                          <a:rPr lang="it-IT" b="1" i="1" smtClean="0">
+                            <a:latin typeface="+mj-lt"/>
+                          </a:rPr>
+                          <m:t>𝒚</m:t>
+                        </m:r>
+                      </m:e>
+                    </m:acc>
+                    <m:r>
+                      <a:rPr lang="it-IT" b="1" i="1">
+                        <a:latin typeface="+mj-lt"/>
+                      </a:rPr>
+                      <m:t>=</m:t>
+                    </m:r>
+                    <m:d>
+                      <m:dPr>
+                        <m:ctrlPr>
+                          <a:rPr lang="it-IT" b="1" i="1">
+                            <a:latin typeface="+mj-lt"/>
+                          </a:rPr>
+                        </m:ctrlPr>
+                      </m:dPr>
+                      <m:e>
+                        <m:sSub>
+                          <m:sSubPr>
+                            <m:ctrlPr>
+                              <a:rPr lang="it-IT" b="1" i="1">
+                                <a:latin typeface="+mj-lt"/>
+                              </a:rPr>
+                            </m:ctrlPr>
+                          </m:sSubPr>
+                          <m:e>
+                            <m:r>
+                              <a:rPr lang="it-IT" b="1" i="1" smtClean="0">
+                                <a:latin typeface="+mj-lt"/>
+                              </a:rPr>
+                              <m:t>𝒚</m:t>
+                            </m:r>
+                          </m:e>
+                          <m:sub>
+                            <m:r>
+                              <a:rPr lang="it-IT" b="1" i="1">
+                                <a:latin typeface="+mj-lt"/>
+                              </a:rPr>
+                              <m:t>𝟏</m:t>
+                            </m:r>
+                          </m:sub>
+                        </m:sSub>
+                        <m:r>
+                          <a:rPr lang="it-IT" b="1" i="1">
+                            <a:latin typeface="+mj-lt"/>
+                          </a:rPr>
+                          <m:t>,</m:t>
+                        </m:r>
+                        <m:sSub>
+                          <m:sSubPr>
+                            <m:ctrlPr>
+                              <a:rPr lang="it-IT" b="1" i="1">
+                                <a:latin typeface="+mj-lt"/>
+                              </a:rPr>
+                            </m:ctrlPr>
+                          </m:sSubPr>
+                          <m:e>
+                            <m:r>
+                              <a:rPr lang="it-IT" b="1" i="1" smtClean="0">
+                                <a:latin typeface="+mj-lt"/>
+                              </a:rPr>
+                              <m:t>𝒚</m:t>
+                            </m:r>
+                          </m:e>
+                          <m:sub>
+                            <m:r>
+                              <a:rPr lang="it-IT" b="1" i="1">
+                                <a:latin typeface="+mj-lt"/>
+                              </a:rPr>
+                              <m:t>𝟐</m:t>
+                            </m:r>
+                          </m:sub>
+                        </m:sSub>
+                        <m:r>
+                          <a:rPr lang="it-IT" b="1" i="1">
+                            <a:latin typeface="+mj-lt"/>
+                          </a:rPr>
+                          <m:t>,</m:t>
+                        </m:r>
+                        <m:sSub>
+                          <m:sSubPr>
+                            <m:ctrlPr>
+                              <a:rPr lang="it-IT" b="1" i="1">
+                                <a:latin typeface="+mj-lt"/>
+                              </a:rPr>
+                            </m:ctrlPr>
+                          </m:sSubPr>
+                          <m:e>
+                            <m:r>
+                              <a:rPr lang="it-IT" b="1" i="1" smtClean="0">
+                                <a:latin typeface="+mj-lt"/>
+                              </a:rPr>
+                              <m:t>𝒚</m:t>
+                            </m:r>
+                          </m:e>
+                          <m:sub>
+                            <m:r>
+                              <a:rPr lang="it-IT" b="1" i="1">
+                                <a:latin typeface="+mj-lt"/>
+                              </a:rPr>
+                              <m:t>𝟑</m:t>
+                            </m:r>
+                          </m:sub>
+                        </m:sSub>
+                      </m:e>
+                    </m:d>
+                    <m:r>
+                      <a:rPr lang="it-IT" b="1" i="1" smtClean="0">
+                        <a:latin typeface="+mj-lt"/>
+                      </a:rPr>
+                      <m:t>→</m:t>
+                    </m:r>
+                  </m:oMath>
+                </a14:m>
+                <a:r>
+                  <a:rPr lang="it-IT" b="1" dirty="0">
+                    <a:latin typeface="+mj-lt"/>
+                  </a:rPr>
+                  <a:t>…</a:t>
+                </a:r>
+              </a:p>
+              <a:p>
+                <a:pPr marL="285750" indent="-285750">
+                  <a:buFontTx/>
+                  <a:buChar char="-"/>
+                </a:pPr>
+                <a14:m>
+                  <m:oMath xmlns:m="http://schemas.openxmlformats.org/officeDocument/2006/math">
+                    <m:acc>
+                      <m:accPr>
+                        <m:chr m:val="̂"/>
+                        <m:ctrlPr>
+                          <a:rPr lang="it-IT" b="1" i="1">
+                            <a:latin typeface="+mj-lt"/>
+                          </a:rPr>
+                        </m:ctrlPr>
+                      </m:accPr>
+                      <m:e>
+                        <m:r>
+                          <a:rPr lang="it-IT" b="1" i="1" smtClean="0">
+                            <a:latin typeface="+mj-lt"/>
+                          </a:rPr>
+                          <m:t>𝒛</m:t>
+                        </m:r>
+                      </m:e>
+                    </m:acc>
+                    <m:r>
+                      <a:rPr lang="it-IT" b="1" i="1">
+                        <a:latin typeface="+mj-lt"/>
+                      </a:rPr>
+                      <m:t>=</m:t>
+                    </m:r>
+                    <m:d>
+                      <m:dPr>
+                        <m:ctrlPr>
+                          <a:rPr lang="it-IT" b="1" i="1">
+                            <a:latin typeface="+mj-lt"/>
+                          </a:rPr>
+                        </m:ctrlPr>
+                      </m:dPr>
+                      <m:e>
+                        <m:sSub>
+                          <m:sSubPr>
+                            <m:ctrlPr>
+                              <a:rPr lang="it-IT" b="1" i="1">
+                                <a:latin typeface="+mj-lt"/>
+                              </a:rPr>
+                            </m:ctrlPr>
+                          </m:sSubPr>
+                          <m:e>
+                            <m:r>
+                              <a:rPr lang="it-IT" b="1" i="1" smtClean="0">
+                                <a:latin typeface="+mj-lt"/>
+                              </a:rPr>
+                              <m:t>𝒛</m:t>
+                            </m:r>
+                          </m:e>
+                          <m:sub>
+                            <m:r>
+                              <a:rPr lang="it-IT" b="1" i="1">
+                                <a:latin typeface="+mj-lt"/>
+                              </a:rPr>
+                              <m:t>𝟏</m:t>
+                            </m:r>
+                          </m:sub>
+                        </m:sSub>
+                        <m:r>
+                          <a:rPr lang="it-IT" b="1" i="1">
+                            <a:latin typeface="+mj-lt"/>
+                          </a:rPr>
+                          <m:t>,</m:t>
+                        </m:r>
+                        <m:sSub>
+                          <m:sSubPr>
+                            <m:ctrlPr>
+                              <a:rPr lang="it-IT" b="1" i="1">
+                                <a:latin typeface="+mj-lt"/>
+                              </a:rPr>
+                            </m:ctrlPr>
+                          </m:sSubPr>
+                          <m:e>
+                            <m:r>
+                              <a:rPr lang="it-IT" b="1" i="1" smtClean="0">
+                                <a:latin typeface="+mj-lt"/>
+                              </a:rPr>
+                              <m:t>𝒛</m:t>
+                            </m:r>
+                          </m:e>
+                          <m:sub>
+                            <m:r>
+                              <a:rPr lang="it-IT" b="1" i="1">
+                                <a:latin typeface="+mj-lt"/>
+                              </a:rPr>
+                              <m:t>𝟐</m:t>
+                            </m:r>
+                          </m:sub>
+                        </m:sSub>
+                        <m:r>
+                          <a:rPr lang="it-IT" b="1" i="1">
+                            <a:latin typeface="+mj-lt"/>
+                          </a:rPr>
+                          <m:t>,</m:t>
+                        </m:r>
+                        <m:sSub>
+                          <m:sSubPr>
+                            <m:ctrlPr>
+                              <a:rPr lang="it-IT" b="1" i="1">
+                                <a:latin typeface="+mj-lt"/>
+                              </a:rPr>
+                            </m:ctrlPr>
+                          </m:sSubPr>
+                          <m:e>
+                            <m:r>
+                              <a:rPr lang="it-IT" b="1" i="1" smtClean="0">
+                                <a:latin typeface="+mj-lt"/>
+                              </a:rPr>
+                              <m:t>𝒛</m:t>
+                            </m:r>
+                          </m:e>
+                          <m:sub>
+                            <m:r>
+                              <a:rPr lang="it-IT" b="1" i="1">
+                                <a:latin typeface="+mj-lt"/>
+                              </a:rPr>
+                              <m:t>𝟑</m:t>
+                            </m:r>
+                          </m:sub>
+                        </m:sSub>
+                      </m:e>
+                    </m:d>
+                    <m:r>
+                      <a:rPr lang="it-IT" b="1" i="1" smtClean="0">
+                        <a:latin typeface="+mj-lt"/>
+                      </a:rPr>
+                      <m:t>→</m:t>
+                    </m:r>
+                  </m:oMath>
+                </a14:m>
+                <a:r>
+                  <a:rPr lang="it-IT" b="1" dirty="0">
+                    <a:latin typeface="+mj-lt"/>
+                  </a:rPr>
+                  <a:t>…</a:t>
+                </a:r>
+              </a:p>
+              <a:p>
+                <a:endParaRPr lang="it-IT" b="1" dirty="0"/>
+              </a:p>
+            </p:txBody>
+          </p:sp>
+        </mc:Choice>
+        <mc:Fallback>
+          <p:sp>
+            <p:nvSpPr>
+              <p:cNvPr id="2" name="CasellaDiTesto 1">
+                <a:extLst>
+                  <a:ext uri="{FF2B5EF4-FFF2-40B4-BE49-F238E27FC236}">
+                    <a16:creationId xmlns:a16="http://schemas.microsoft.com/office/drawing/2014/main" id="{088AE33C-2FC4-40BF-AD2E-0281C7FB534C}"/>
+                  </a:ext>
+                </a:extLst>
+              </p:cNvPr>
+              <p:cNvSpPr txBox="1">
+                <a:spLocks noRot="1" noChangeAspect="1" noMove="1" noResize="1" noEditPoints="1" noAdjustHandles="1" noChangeArrowheads="1" noChangeShapeType="1" noTextEdit="1"/>
+              </p:cNvSpPr>
+              <p:nvPr/>
+            </p:nvSpPr>
+            <p:spPr>
+              <a:xfrm>
+                <a:off x="1018783" y="1556087"/>
+                <a:ext cx="7277954" cy="2031325"/>
+              </a:xfrm>
+              <a:prstGeom prst="rect">
+                <a:avLst/>
+              </a:prstGeom>
+              <a:blipFill>
+                <a:blip r:embed="rId2"/>
+                <a:stretch>
+                  <a:fillRect l="-921" t="-2703"/>
+                </a:stretch>
+              </a:blipFill>
+            </p:spPr>
+            <p:txBody>
+              <a:bodyPr/>
+              <a:lstStyle/>
+              <a:p>
+                <a:r>
+                  <a:rPr lang="it-IT">
+                    <a:noFill/>
+                  </a:rPr>
+                  <a:t> </a:t>
+                </a:r>
+              </a:p>
+            </p:txBody>
+          </p:sp>
+        </mc:Fallback>
+      </mc:AlternateContent>
     </p:spTree>
     <p:extLst>
       <p:ext uri="{BB962C8B-B14F-4D97-AF65-F5344CB8AC3E}">
@@ -11983,6 +13309,496 @@
           <a:chExt cx="0" cy="0"/>
         </a:xfrm>
       </p:grpSpPr>
+      <p:sp>
+        <p:nvSpPr>
+          <p:cNvPr id="2" name="CasellaDiTesto 1">
+            <a:extLst>
+              <a:ext uri="{FF2B5EF4-FFF2-40B4-BE49-F238E27FC236}">
+                <a16:creationId xmlns:a16="http://schemas.microsoft.com/office/drawing/2014/main" id="{1CDA8DE0-6303-4F72-9403-DDA620EC34F2}"/>
+              </a:ext>
+            </a:extLst>
+          </p:cNvPr>
+          <p:cNvSpPr txBox="1"/>
+          <p:nvPr/>
+        </p:nvSpPr>
+        <p:spPr>
+          <a:xfrm>
+            <a:off x="467544" y="411510"/>
+            <a:ext cx="3622338" cy="523220"/>
+          </a:xfrm>
+          <a:prstGeom prst="rect">
+            <a:avLst/>
+          </a:prstGeom>
+          <a:noFill/>
+        </p:spPr>
+        <p:txBody>
+          <a:bodyPr wrap="none" rtlCol="0">
+            <a:spAutoFit/>
+          </a:bodyPr>
+          <a:lstStyle/>
+          <a:p>
+            <a:r>
+              <a:rPr lang="it-IT" sz="2800" b="1" dirty="0">
+                <a:latin typeface="+mj-lt"/>
+              </a:rPr>
+              <a:t>La matrice di rotazione</a:t>
+            </a:r>
+          </a:p>
+        </p:txBody>
+      </p:sp>
+      <mc:AlternateContent xmlns:mc="http://schemas.openxmlformats.org/markup-compatibility/2006">
+        <mc:Choice xmlns:a14="http://schemas.microsoft.com/office/drawing/2010/main" Requires="a14">
+          <p:sp>
+            <p:nvSpPr>
+              <p:cNvPr id="3" name="CasellaDiTesto 2">
+                <a:extLst>
+                  <a:ext uri="{FF2B5EF4-FFF2-40B4-BE49-F238E27FC236}">
+                    <a16:creationId xmlns:a16="http://schemas.microsoft.com/office/drawing/2014/main" id="{92F6D8C8-E759-412A-A3E3-E611F43EE61C}"/>
+                  </a:ext>
+                </a:extLst>
+              </p:cNvPr>
+              <p:cNvSpPr txBox="1"/>
+              <p:nvPr/>
+            </p:nvSpPr>
+            <p:spPr>
+              <a:xfrm>
+                <a:off x="971600" y="1275606"/>
+                <a:ext cx="6624736" cy="3042179"/>
+              </a:xfrm>
+              <a:prstGeom prst="rect">
+                <a:avLst/>
+              </a:prstGeom>
+              <a:noFill/>
+            </p:spPr>
+            <p:txBody>
+              <a:bodyPr wrap="square" rtlCol="0">
+                <a:spAutoFit/>
+              </a:bodyPr>
+              <a:lstStyle/>
+              <a:p>
+                <a:r>
+                  <a:rPr lang="it-IT" dirty="0">
+                    <a:latin typeface="+mj-lt"/>
+                  </a:rPr>
+                  <a:t>Le informazioni appena ricavate in merito al posizionamento di una terna rispetto ad un’altra possono essere racchiuse in un’unica matrice: la matrice di rotazione, così composta</a:t>
+                </a:r>
+              </a:p>
+              <a:p>
+                <a:endParaRPr lang="it-IT" dirty="0">
+                  <a:latin typeface="+mj-lt"/>
+                </a:endParaRPr>
+              </a:p>
+              <a:p>
+                <a14:m>
+                  <m:oMathPara xmlns:m="http://schemas.openxmlformats.org/officeDocument/2006/math">
+                    <m:oMathParaPr>
+                      <m:jc m:val="centerGroup"/>
+                    </m:oMathParaPr>
+                    <m:oMath xmlns:m="http://schemas.openxmlformats.org/officeDocument/2006/math">
+                      <m:sPre>
+                        <m:sPrePr>
+                          <m:ctrlPr>
+                            <a:rPr lang="it-IT" i="1" smtClean="0">
+                              <a:latin typeface="+mj-lt"/>
+                            </a:rPr>
+                          </m:ctrlPr>
+                        </m:sPrePr>
+                        <m:sub>
+                          <m:r>
+                            <a:rPr lang="it-IT" b="0" i="1" smtClean="0">
+                              <a:latin typeface="+mj-lt"/>
+                            </a:rPr>
+                            <m:t>𝐵</m:t>
+                          </m:r>
+                        </m:sub>
+                        <m:sup>
+                          <m:r>
+                            <a:rPr lang="it-IT" b="0" i="1" smtClean="0">
+                              <a:latin typeface="+mj-lt"/>
+                            </a:rPr>
+                            <m:t>𝐴</m:t>
+                          </m:r>
+                        </m:sup>
+                        <m:e>
+                          <m:r>
+                            <a:rPr lang="it-IT" b="0" i="1" smtClean="0">
+                              <a:latin typeface="+mj-lt"/>
+                            </a:rPr>
+                            <m:t>𝑅</m:t>
+                          </m:r>
+                        </m:e>
+                      </m:sPre>
+                      <m:r>
+                        <a:rPr lang="it-IT" b="0" i="1" smtClean="0">
+                          <a:latin typeface="+mj-lt"/>
+                        </a:rPr>
+                        <m:t>=</m:t>
+                      </m:r>
+                      <m:d>
+                        <m:dPr>
+                          <m:begChr m:val="["/>
+                          <m:endChr m:val="]"/>
+                          <m:ctrlPr>
+                            <a:rPr lang="it-IT" b="0" i="1" smtClean="0">
+                              <a:latin typeface="+mj-lt"/>
+                            </a:rPr>
+                          </m:ctrlPr>
+                        </m:dPr>
+                        <m:e>
+                          <m:r>
+                            <a:rPr lang="it-IT" b="0" i="1" smtClean="0">
+                              <a:latin typeface="+mj-lt"/>
+                            </a:rPr>
+                            <m:t> </m:t>
+                          </m:r>
+                          <m:m>
+                            <m:mPr>
+                              <m:mcs>
+                                <m:mc>
+                                  <m:mcPr>
+                                    <m:count m:val="3"/>
+                                    <m:mcJc m:val="center"/>
+                                  </m:mcPr>
+                                </m:mc>
+                              </m:mcs>
+                              <m:ctrlPr>
+                                <a:rPr lang="it-IT" b="0" i="1" smtClean="0">
+                                  <a:latin typeface="+mj-lt"/>
+                                </a:rPr>
+                              </m:ctrlPr>
+                            </m:mPr>
+                            <m:mr>
+                              <m:e>
+                                <m:sSub>
+                                  <m:sSubPr>
+                                    <m:ctrlPr>
+                                      <a:rPr lang="it-IT" b="0" i="1" smtClean="0">
+                                        <a:latin typeface="+mj-lt"/>
+                                      </a:rPr>
+                                    </m:ctrlPr>
+                                  </m:sSubPr>
+                                  <m:e>
+                                    <m:r>
+                                      <m:rPr>
+                                        <m:brk m:alnAt="7"/>
+                                      </m:rPr>
+                                      <a:rPr lang="it-IT" b="0" i="1" smtClean="0">
+                                        <a:latin typeface="+mj-lt"/>
+                                      </a:rPr>
+                                      <m:t>𝑥</m:t>
+                                    </m:r>
+                                  </m:e>
+                                  <m:sub>
+                                    <m:r>
+                                      <m:rPr>
+                                        <m:brk m:alnAt="7"/>
+                                      </m:rPr>
+                                      <a:rPr lang="it-IT" b="0" i="1" smtClean="0">
+                                        <a:latin typeface="+mj-lt"/>
+                                      </a:rPr>
+                                      <m:t>1</m:t>
+                                    </m:r>
+                                  </m:sub>
+                                </m:sSub>
+                              </m:e>
+                              <m:e>
+                                <m:sSub>
+                                  <m:sSubPr>
+                                    <m:ctrlPr>
+                                      <a:rPr lang="it-IT" b="0" i="1" smtClean="0">
+                                        <a:latin typeface="+mj-lt"/>
+                                      </a:rPr>
+                                    </m:ctrlPr>
+                                  </m:sSubPr>
+                                  <m:e>
+                                    <m:r>
+                                      <a:rPr lang="it-IT" b="0" i="1" smtClean="0">
+                                        <a:latin typeface="+mj-lt"/>
+                                      </a:rPr>
+                                      <m:t>𝑦</m:t>
+                                    </m:r>
+                                  </m:e>
+                                  <m:sub>
+                                    <m:r>
+                                      <a:rPr lang="it-IT" b="0" i="1" smtClean="0">
+                                        <a:latin typeface="+mj-lt"/>
+                                      </a:rPr>
+                                      <m:t>1</m:t>
+                                    </m:r>
+                                  </m:sub>
+                                </m:sSub>
+                              </m:e>
+                              <m:e>
+                                <m:sSub>
+                                  <m:sSubPr>
+                                    <m:ctrlPr>
+                                      <a:rPr lang="it-IT" b="0" i="1" smtClean="0">
+                                        <a:latin typeface="+mj-lt"/>
+                                      </a:rPr>
+                                    </m:ctrlPr>
+                                  </m:sSubPr>
+                                  <m:e>
+                                    <m:r>
+                                      <a:rPr lang="it-IT" b="0" i="1" smtClean="0">
+                                        <a:latin typeface="+mj-lt"/>
+                                      </a:rPr>
+                                      <m:t>𝑧</m:t>
+                                    </m:r>
+                                  </m:e>
+                                  <m:sub>
+                                    <m:r>
+                                      <a:rPr lang="it-IT" b="0" i="1" smtClean="0">
+                                        <a:latin typeface="+mj-lt"/>
+                                      </a:rPr>
+                                      <m:t>1</m:t>
+                                    </m:r>
+                                  </m:sub>
+                                </m:sSub>
+                              </m:e>
+                            </m:mr>
+                            <m:mr>
+                              <m:e>
+                                <m:sSub>
+                                  <m:sSubPr>
+                                    <m:ctrlPr>
+                                      <a:rPr lang="it-IT" b="0" i="1" smtClean="0">
+                                        <a:latin typeface="+mj-lt"/>
+                                      </a:rPr>
+                                    </m:ctrlPr>
+                                  </m:sSubPr>
+                                  <m:e>
+                                    <m:r>
+                                      <a:rPr lang="it-IT" b="0" i="1" smtClean="0">
+                                        <a:latin typeface="+mj-lt"/>
+                                      </a:rPr>
+                                      <m:t>𝑥</m:t>
+                                    </m:r>
+                                  </m:e>
+                                  <m:sub>
+                                    <m:r>
+                                      <a:rPr lang="it-IT" b="0" i="1" smtClean="0">
+                                        <a:latin typeface="+mj-lt"/>
+                                      </a:rPr>
+                                      <m:t>2</m:t>
+                                    </m:r>
+                                  </m:sub>
+                                </m:sSub>
+                              </m:e>
+                              <m:e>
+                                <m:sSub>
+                                  <m:sSubPr>
+                                    <m:ctrlPr>
+                                      <a:rPr lang="it-IT" b="0" i="1" smtClean="0">
+                                        <a:latin typeface="+mj-lt"/>
+                                      </a:rPr>
+                                    </m:ctrlPr>
+                                  </m:sSubPr>
+                                  <m:e>
+                                    <m:r>
+                                      <a:rPr lang="it-IT" b="0" i="1" smtClean="0">
+                                        <a:latin typeface="+mj-lt"/>
+                                      </a:rPr>
+                                      <m:t>𝑦</m:t>
+                                    </m:r>
+                                  </m:e>
+                                  <m:sub>
+                                    <m:r>
+                                      <a:rPr lang="it-IT" b="0" i="1" smtClean="0">
+                                        <a:latin typeface="+mj-lt"/>
+                                      </a:rPr>
+                                      <m:t>2</m:t>
+                                    </m:r>
+                                  </m:sub>
+                                </m:sSub>
+                              </m:e>
+                              <m:e>
+                                <m:sSub>
+                                  <m:sSubPr>
+                                    <m:ctrlPr>
+                                      <a:rPr lang="it-IT" b="0" i="1" smtClean="0">
+                                        <a:latin typeface="+mj-lt"/>
+                                      </a:rPr>
+                                    </m:ctrlPr>
+                                  </m:sSubPr>
+                                  <m:e>
+                                    <m:r>
+                                      <a:rPr lang="it-IT" b="0" i="1" smtClean="0">
+                                        <a:latin typeface="+mj-lt"/>
+                                      </a:rPr>
+                                      <m:t>𝑧</m:t>
+                                    </m:r>
+                                  </m:e>
+                                  <m:sub>
+                                    <m:r>
+                                      <a:rPr lang="it-IT" b="0" i="1" smtClean="0">
+                                        <a:latin typeface="+mj-lt"/>
+                                      </a:rPr>
+                                      <m:t>2</m:t>
+                                    </m:r>
+                                  </m:sub>
+                                </m:sSub>
+                              </m:e>
+                            </m:mr>
+                            <m:mr>
+                              <m:e>
+                                <m:sSub>
+                                  <m:sSubPr>
+                                    <m:ctrlPr>
+                                      <a:rPr lang="it-IT" b="0" i="1" smtClean="0">
+                                        <a:latin typeface="+mj-lt"/>
+                                      </a:rPr>
+                                    </m:ctrlPr>
+                                  </m:sSubPr>
+                                  <m:e>
+                                    <m:r>
+                                      <a:rPr lang="it-IT" b="0" i="1" smtClean="0">
+                                        <a:latin typeface="+mj-lt"/>
+                                      </a:rPr>
+                                      <m:t>𝑥</m:t>
+                                    </m:r>
+                                  </m:e>
+                                  <m:sub>
+                                    <m:r>
+                                      <a:rPr lang="it-IT" b="0" i="1" smtClean="0">
+                                        <a:latin typeface="+mj-lt"/>
+                                      </a:rPr>
+                                      <m:t>3</m:t>
+                                    </m:r>
+                                  </m:sub>
+                                </m:sSub>
+                              </m:e>
+                              <m:e>
+                                <m:sSub>
+                                  <m:sSubPr>
+                                    <m:ctrlPr>
+                                      <a:rPr lang="it-IT" b="0" i="1" smtClean="0">
+                                        <a:latin typeface="+mj-lt"/>
+                                      </a:rPr>
+                                    </m:ctrlPr>
+                                  </m:sSubPr>
+                                  <m:e>
+                                    <m:r>
+                                      <a:rPr lang="it-IT" b="0" i="1" smtClean="0">
+                                        <a:latin typeface="+mj-lt"/>
+                                      </a:rPr>
+                                      <m:t>𝑦</m:t>
+                                    </m:r>
+                                  </m:e>
+                                  <m:sub>
+                                    <m:r>
+                                      <a:rPr lang="it-IT" b="0" i="1" smtClean="0">
+                                        <a:latin typeface="+mj-lt"/>
+                                      </a:rPr>
+                                      <m:t>3</m:t>
+                                    </m:r>
+                                  </m:sub>
+                                </m:sSub>
+                              </m:e>
+                              <m:e>
+                                <m:sSub>
+                                  <m:sSubPr>
+                                    <m:ctrlPr>
+                                      <a:rPr lang="it-IT" b="0" i="1" smtClean="0">
+                                        <a:latin typeface="+mj-lt"/>
+                                      </a:rPr>
+                                    </m:ctrlPr>
+                                  </m:sSubPr>
+                                  <m:e>
+                                    <m:r>
+                                      <a:rPr lang="it-IT" b="0" i="1" smtClean="0">
+                                        <a:latin typeface="+mj-lt"/>
+                                      </a:rPr>
+                                      <m:t>𝑧</m:t>
+                                    </m:r>
+                                  </m:e>
+                                  <m:sub>
+                                    <m:r>
+                                      <a:rPr lang="it-IT" b="0" i="1" smtClean="0">
+                                        <a:latin typeface="+mj-lt"/>
+                                      </a:rPr>
+                                      <m:t>3</m:t>
+                                    </m:r>
+                                  </m:sub>
+                                </m:sSub>
+                              </m:e>
+                            </m:mr>
+                          </m:m>
+                        </m:e>
+                      </m:d>
+                    </m:oMath>
+                  </m:oMathPara>
+                </a14:m>
+                <a:endParaRPr lang="it-IT" dirty="0">
+                  <a:latin typeface="+mj-lt"/>
+                </a:endParaRPr>
+              </a:p>
+              <a:p>
+                <a:endParaRPr lang="it-IT" dirty="0">
+                  <a:latin typeface="+mj-lt"/>
+                </a:endParaRPr>
+              </a:p>
+              <a:p>
+                <a:r>
+                  <a:rPr lang="it-IT" dirty="0">
+                    <a:latin typeface="+mj-lt"/>
+                  </a:rPr>
+                  <a:t> In questo caso i pedici hanno lo scopo di indicare il fatto che la </a:t>
+                </a:r>
+                <a:r>
+                  <a:rPr lang="it-IT" b="1" dirty="0">
+                    <a:latin typeface="+mj-lt"/>
+                  </a:rPr>
+                  <a:t>matrice R indica la rotazione della terna B rispetto alla terna A, la quale è considerata fissa.</a:t>
+                </a:r>
+              </a:p>
+            </p:txBody>
+          </p:sp>
+        </mc:Choice>
+        <mc:Fallback>
+          <p:sp>
+            <p:nvSpPr>
+              <p:cNvPr id="3" name="CasellaDiTesto 2">
+                <a:extLst>
+                  <a:ext uri="{FF2B5EF4-FFF2-40B4-BE49-F238E27FC236}">
+                    <a16:creationId xmlns:a16="http://schemas.microsoft.com/office/drawing/2014/main" id="{92F6D8C8-E759-412A-A3E3-E611F43EE61C}"/>
+                  </a:ext>
+                </a:extLst>
+              </p:cNvPr>
+              <p:cNvSpPr txBox="1">
+                <a:spLocks noRot="1" noChangeAspect="1" noMove="1" noResize="1" noEditPoints="1" noAdjustHandles="1" noChangeArrowheads="1" noChangeShapeType="1" noTextEdit="1"/>
+              </p:cNvSpPr>
+              <p:nvPr/>
+            </p:nvSpPr>
+            <p:spPr>
+              <a:xfrm>
+                <a:off x="971600" y="1275606"/>
+                <a:ext cx="6624736" cy="3042179"/>
+              </a:xfrm>
+              <a:prstGeom prst="rect">
+                <a:avLst/>
+              </a:prstGeom>
+              <a:blipFill>
+                <a:blip r:embed="rId2"/>
+                <a:stretch>
+                  <a:fillRect l="-736" t="-802" r="-184" b="-2405"/>
+                </a:stretch>
+              </a:blipFill>
+            </p:spPr>
+            <p:txBody>
+              <a:bodyPr/>
+              <a:lstStyle/>
+              <a:p>
+                <a:r>
+                  <a:rPr lang="it-IT">
+                    <a:noFill/>
+                  </a:rPr>
+                  <a:t> </a:t>
+                </a:r>
+              </a:p>
+            </p:txBody>
+          </p:sp>
+        </mc:Fallback>
+      </mc:AlternateContent>
     </p:spTree>
     <p:extLst>
       <p:ext uri="{BB962C8B-B14F-4D97-AF65-F5344CB8AC3E}">
@@ -13545,15 +15361,33 @@
                                   </p:childTnLst>
                                 </p:cTn>
                               </p:par>
+                            </p:childTnLst>
+                          </p:cTn>
+                        </p:par>
+                      </p:childTnLst>
+                    </p:cTn>
+                  </p:par>
+                  <p:par>
+                    <p:cTn id="8" fill="hold">
+                      <p:stCondLst>
+                        <p:cond delay="indefinite"/>
+                      </p:stCondLst>
+                      <p:childTnLst>
+                        <p:par>
+                          <p:cTn id="9" fill="hold">
+                            <p:stCondLst>
+                              <p:cond delay="0"/>
+                            </p:stCondLst>
+                            <p:childTnLst>
                               <p:par>
-                                <p:cTn id="8" presetID="10" presetClass="entr" presetSubtype="0" fill="hold" nodeType="withEffect">
+                                <p:cTn id="10" presetID="10" presetClass="entr" presetSubtype="0" fill="hold" nodeType="clickEffect">
                                   <p:stCondLst>
                                     <p:cond delay="0"/>
                                   </p:stCondLst>
                                   <p:childTnLst>
                                     <p:set>
                                       <p:cBhvr>
-                                        <p:cTn id="9" dur="1" fill="hold">
+                                        <p:cTn id="11" dur="1" fill="hold">
                                           <p:stCondLst>
                                             <p:cond delay="0"/>
                                           </p:stCondLst>
@@ -13571,7 +15405,7 @@
                                     </p:set>
                                     <p:animEffect transition="in" filter="fade">
                                       <p:cBhvr>
-                                        <p:cTn id="10" dur="500"/>
+                                        <p:cTn id="12" dur="500"/>
                                         <p:tgtEl>
                                           <p:spTgt spid="3"/>
                                         </p:tgtEl>
@@ -13587,26 +15421,26 @@
                     </p:cTn>
                   </p:par>
                   <p:par>
-                    <p:cTn id="11" fill="hold">
+                    <p:cTn id="13" fill="hold">
                       <p:stCondLst>
                         <p:cond delay="indefinite"/>
                       </p:stCondLst>
                       <p:childTnLst>
                         <p:par>
-                          <p:cTn id="12" fill="hold">
+                          <p:cTn id="14" fill="hold">
                             <p:stCondLst>
                               <p:cond delay="0"/>
                             </p:stCondLst>
                             <p:childTnLst>
                               <p:par>
-                                <p:cTn id="13" presetID="10" presetClass="entr" presetSubtype="0" fill="hold" grpId="0" nodeType="clickEffect">
+                                <p:cTn id="15" presetID="10" presetClass="entr" presetSubtype="0" fill="hold" grpId="0" nodeType="clickEffect">
                                   <p:stCondLst>
                                     <p:cond delay="0"/>
                                   </p:stCondLst>
                                   <p:childTnLst>
                                     <p:set>
                                       <p:cBhvr>
-                                        <p:cTn id="14" dur="1" fill="hold">
+                                        <p:cTn id="16" dur="1" fill="hold">
                                           <p:stCondLst>
                                             <p:cond delay="0"/>
                                           </p:stCondLst>
@@ -13628,7 +15462,7 @@
                                     </p:set>
                                     <p:animEffect transition="in" filter="fade">
                                       <p:cBhvr>
-                                        <p:cTn id="15" dur="500"/>
+                                        <p:cTn id="17" dur="500"/>
                                         <p:tgtEl>
                                           <p:spTgt spid="5">
                                             <p:txEl>
@@ -13648,26 +15482,26 @@
                     </p:cTn>
                   </p:par>
                   <p:par>
-                    <p:cTn id="16" fill="hold">
+                    <p:cTn id="18" fill="hold">
                       <p:stCondLst>
                         <p:cond delay="indefinite"/>
                       </p:stCondLst>
                       <p:childTnLst>
                         <p:par>
-                          <p:cTn id="17" fill="hold">
+                          <p:cTn id="19" fill="hold">
                             <p:stCondLst>
                               <p:cond delay="0"/>
                             </p:stCondLst>
                             <p:childTnLst>
                               <p:par>
-                                <p:cTn id="18" presetID="10" presetClass="entr" presetSubtype="0" fill="hold" grpId="0" nodeType="clickEffect">
+                                <p:cTn id="20" presetID="10" presetClass="entr" presetSubtype="0" fill="hold" grpId="0" nodeType="clickEffect">
                                   <p:stCondLst>
                                     <p:cond delay="0"/>
                                   </p:stCondLst>
                                   <p:childTnLst>
                                     <p:set>
                                       <p:cBhvr>
-                                        <p:cTn id="19" dur="1" fill="hold">
+                                        <p:cTn id="21" dur="1" fill="hold">
                                           <p:stCondLst>
                                             <p:cond delay="0"/>
                                           </p:stCondLst>
@@ -13689,7 +15523,7 @@
                                     </p:set>
                                     <p:animEffect transition="in" filter="fade">
                                       <p:cBhvr>
-                                        <p:cTn id="20" dur="500"/>
+                                        <p:cTn id="22" dur="500"/>
                                         <p:tgtEl>
                                           <p:spTgt spid="5">
                                             <p:txEl>
@@ -13702,15 +15536,33 @@
                                   </p:childTnLst>
                                 </p:cTn>
                               </p:par>
+                            </p:childTnLst>
+                          </p:cTn>
+                        </p:par>
+                      </p:childTnLst>
+                    </p:cTn>
+                  </p:par>
+                  <p:par>
+                    <p:cTn id="23" fill="hold">
+                      <p:stCondLst>
+                        <p:cond delay="indefinite"/>
+                      </p:stCondLst>
+                      <p:childTnLst>
+                        <p:par>
+                          <p:cTn id="24" fill="hold">
+                            <p:stCondLst>
+                              <p:cond delay="0"/>
+                            </p:stCondLst>
+                            <p:childTnLst>
                               <p:par>
-                                <p:cTn id="21" presetID="10" presetClass="entr" presetSubtype="0" fill="hold" nodeType="withEffect">
+                                <p:cTn id="25" presetID="10" presetClass="entr" presetSubtype="0" fill="hold" nodeType="clickEffect">
                                   <p:stCondLst>
                                     <p:cond delay="0"/>
                                   </p:stCondLst>
                                   <p:childTnLst>
                                     <p:set>
                                       <p:cBhvr>
-                                        <p:cTn id="22" dur="1" fill="hold">
+                                        <p:cTn id="26" dur="1" fill="hold">
                                           <p:stCondLst>
                                             <p:cond delay="0"/>
                                           </p:stCondLst>
@@ -13728,7 +15580,7 @@
                                     </p:set>
                                     <p:animEffect transition="in" filter="fade">
                                       <p:cBhvr>
-                                        <p:cTn id="23" dur="500"/>
+                                        <p:cTn id="27" dur="500"/>
                                         <p:tgtEl>
                                           <p:spTgt spid="6"/>
                                         </p:tgtEl>
@@ -13766,7 +15618,7 @@
     </p:tnLst>
     <p:bldLst>
       <p:bldP spid="4" grpId="0"/>
-      <p:bldP spid="5" grpId="0" build="p"/>
+      <p:bldP spid="5" grpId="0" uiExpand="1" build="p"/>
     </p:bldLst>
   </p:timing>
 </p:sld>
@@ -13966,8 +15818,8 @@
         </p:nvSpPr>
         <p:spPr>
           <a:xfrm>
-            <a:off x="827584" y="3519575"/>
-            <a:ext cx="2091249" cy="646331"/>
+            <a:off x="971600" y="3519575"/>
+            <a:ext cx="2584045" cy="830997"/>
           </a:xfrm>
           <a:prstGeom prst="rect">
             <a:avLst/>
@@ -13981,7 +15833,7 @@
           <a:lstStyle/>
           <a:p>
             <a:r>
-              <a:rPr lang="it-IT" dirty="0">
+              <a:rPr lang="it-IT" sz="2400" b="1" dirty="0">
                 <a:latin typeface="+mj-lt"/>
               </a:rPr>
               <a:t>Come riempire questo bisogno?</a:t>
@@ -13989,82 +15841,103 @@
           </a:p>
         </p:txBody>
       </p:sp>
-      <p:pic>
-        <p:nvPicPr>
-          <p:cNvPr id="9" name="Elemento grafico 8" descr="Lampadina">
+      <p:grpSp>
+        <p:nvGrpSpPr>
+          <p:cNvPr id="2" name="Gruppo 1">
             <a:extLst>
               <a:ext uri="{FF2B5EF4-FFF2-40B4-BE49-F238E27FC236}">
-                <a16:creationId xmlns:a16="http://schemas.microsoft.com/office/drawing/2014/main" id="{73F79D91-62C9-4A25-BAB4-82D1588BF27B}"/>
+                <a16:creationId xmlns:a16="http://schemas.microsoft.com/office/drawing/2014/main" id="{3A8ECA21-9E48-4B90-A216-A55D6EB8EA1D}"/>
               </a:ext>
             </a:extLst>
           </p:cNvPr>
-          <p:cNvPicPr>
-            <a:picLocks noChangeAspect="1"/>
-          </p:cNvPicPr>
+          <p:cNvGrpSpPr/>
           <p:nvPr/>
-        </p:nvPicPr>
-        <p:blipFill>
-          <a:blip r:embed="rId3">
-            <a:extLst>
-              <a:ext uri="{28A0092B-C50C-407E-A947-70E740481C1C}">
-                <a14:useLocalDpi xmlns:a14="http://schemas.microsoft.com/office/drawing/2010/main" val="0"/>
-              </a:ext>
-              <a:ext uri="{96DAC541-7B7A-43D3-8B79-37D633B846F1}">
-                <asvg:svgBlip xmlns:asvg="http://schemas.microsoft.com/office/drawing/2016/SVG/main" r:embed="rId4"/>
-              </a:ext>
-            </a:extLst>
-          </a:blip>
-          <a:stretch>
-            <a:fillRect/>
-          </a:stretch>
-        </p:blipFill>
-        <p:spPr>
+        </p:nvGrpSpPr>
+        <p:grpSpPr>
           <a:xfrm>
-            <a:off x="3131840" y="3385542"/>
-            <a:ext cx="914400" cy="914400"/>
+            <a:off x="3768652" y="3385542"/>
+            <a:ext cx="3932452" cy="914400"/>
+            <a:chOff x="3131840" y="3385542"/>
+            <a:chExt cx="3932452" cy="914400"/>
           </a:xfrm>
-          <a:prstGeom prst="rect">
-            <a:avLst/>
-          </a:prstGeom>
-        </p:spPr>
-      </p:pic>
-      <p:sp>
-        <p:nvSpPr>
-          <p:cNvPr id="10" name="CasellaDiTesto 9">
-            <a:extLst>
-              <a:ext uri="{FF2B5EF4-FFF2-40B4-BE49-F238E27FC236}">
-                <a16:creationId xmlns:a16="http://schemas.microsoft.com/office/drawing/2014/main" id="{30C0FAA6-1EAD-48AB-8182-9EA6E4B8F1F4}"/>
-              </a:ext>
-            </a:extLst>
-          </p:cNvPr>
-          <p:cNvSpPr txBox="1"/>
-          <p:nvPr/>
-        </p:nvSpPr>
-        <p:spPr>
-          <a:xfrm>
-            <a:off x="4118870" y="3611909"/>
-            <a:ext cx="2552622" cy="461665"/>
-          </a:xfrm>
-          <a:prstGeom prst="rect">
-            <a:avLst/>
-          </a:prstGeom>
-          <a:noFill/>
-        </p:spPr>
-        <p:txBody>
-          <a:bodyPr wrap="none" rtlCol="0">
-            <a:spAutoFit/>
-          </a:bodyPr>
-          <a:lstStyle/>
-          <a:p>
-            <a:r>
-              <a:rPr lang="it-IT" sz="2400" b="1" dirty="0">
-                <a:latin typeface="+mj-lt"/>
-              </a:rPr>
-              <a:t>AGRICOLTURA 4.0</a:t>
-            </a:r>
-          </a:p>
-        </p:txBody>
-      </p:sp>
+        </p:grpSpPr>
+        <p:pic>
+          <p:nvPicPr>
+            <p:cNvPr id="9" name="Elemento grafico 8" descr="Lampadina">
+              <a:extLst>
+                <a:ext uri="{FF2B5EF4-FFF2-40B4-BE49-F238E27FC236}">
+                  <a16:creationId xmlns:a16="http://schemas.microsoft.com/office/drawing/2014/main" id="{73F79D91-62C9-4A25-BAB4-82D1588BF27B}"/>
+                </a:ext>
+              </a:extLst>
+            </p:cNvPr>
+            <p:cNvPicPr>
+              <a:picLocks noChangeAspect="1"/>
+            </p:cNvPicPr>
+            <p:nvPr/>
+          </p:nvPicPr>
+          <p:blipFill>
+            <a:blip r:embed="rId3">
+              <a:extLst>
+                <a:ext uri="{28A0092B-C50C-407E-A947-70E740481C1C}">
+                  <a14:useLocalDpi xmlns:a14="http://schemas.microsoft.com/office/drawing/2010/main" val="0"/>
+                </a:ext>
+                <a:ext uri="{96DAC541-7B7A-43D3-8B79-37D633B846F1}">
+                  <asvg:svgBlip xmlns:asvg="http://schemas.microsoft.com/office/drawing/2016/SVG/main" r:embed="rId4"/>
+                </a:ext>
+              </a:extLst>
+            </a:blip>
+            <a:stretch>
+              <a:fillRect/>
+            </a:stretch>
+          </p:blipFill>
+          <p:spPr>
+            <a:xfrm>
+              <a:off x="3131840" y="3385542"/>
+              <a:ext cx="914400" cy="914400"/>
+            </a:xfrm>
+            <a:prstGeom prst="rect">
+              <a:avLst/>
+            </a:prstGeom>
+          </p:spPr>
+        </p:pic>
+        <p:sp>
+          <p:nvSpPr>
+            <p:cNvPr id="10" name="CasellaDiTesto 9">
+              <a:extLst>
+                <a:ext uri="{FF2B5EF4-FFF2-40B4-BE49-F238E27FC236}">
+                  <a16:creationId xmlns:a16="http://schemas.microsoft.com/office/drawing/2014/main" id="{30C0FAA6-1EAD-48AB-8182-9EA6E4B8F1F4}"/>
+                </a:ext>
+              </a:extLst>
+            </p:cNvPr>
+            <p:cNvSpPr txBox="1"/>
+            <p:nvPr/>
+          </p:nvSpPr>
+          <p:spPr>
+            <a:xfrm>
+              <a:off x="4118870" y="3611909"/>
+              <a:ext cx="2945422" cy="523220"/>
+            </a:xfrm>
+            <a:prstGeom prst="rect">
+              <a:avLst/>
+            </a:prstGeom>
+            <a:noFill/>
+          </p:spPr>
+          <p:txBody>
+            <a:bodyPr wrap="none" rtlCol="0">
+              <a:spAutoFit/>
+            </a:bodyPr>
+            <a:lstStyle/>
+            <a:p>
+              <a:r>
+                <a:rPr lang="it-IT" sz="2800" b="1" dirty="0">
+                  <a:latin typeface="+mj-lt"/>
+                </a:rPr>
+                <a:t>AGRICOLTURA 4.0</a:t>
+              </a:r>
+            </a:p>
+          </p:txBody>
+        </p:sp>
+      </p:grpSp>
     </p:spTree>
     <p:extLst>
       <p:ext uri="{BB962C8B-B14F-4D97-AF65-F5344CB8AC3E}">
@@ -14075,6 +15948,274 @@
   <p:clrMapOvr>
     <a:masterClrMapping/>
   </p:clrMapOvr>
+  <p:timing>
+    <p:tnLst>
+      <p:par>
+        <p:cTn id="1" dur="indefinite" restart="never" nodeType="tmRoot">
+          <p:childTnLst>
+            <p:seq concurrent="1" nextAc="seek">
+              <p:cTn id="2" dur="indefinite" nodeType="mainSeq">
+                <p:childTnLst>
+                  <p:par>
+                    <p:cTn id="3" fill="hold">
+                      <p:stCondLst>
+                        <p:cond delay="indefinite"/>
+                      </p:stCondLst>
+                      <p:childTnLst>
+                        <p:par>
+                          <p:cTn id="4" fill="hold">
+                            <p:stCondLst>
+                              <p:cond delay="0"/>
+                            </p:stCondLst>
+                            <p:childTnLst>
+                              <p:par>
+                                <p:cTn id="5" presetID="1" presetClass="entr" presetSubtype="0" fill="hold" grpId="0" nodeType="clickEffect">
+                                  <p:stCondLst>
+                                    <p:cond delay="0"/>
+                                  </p:stCondLst>
+                                  <p:childTnLst>
+                                    <p:set>
+                                      <p:cBhvr>
+                                        <p:cTn id="6" dur="1" fill="hold">
+                                          <p:stCondLst>
+                                            <p:cond delay="0"/>
+                                          </p:stCondLst>
+                                        </p:cTn>
+                                        <p:tgtEl>
+                                          <p:spTgt spid="4"/>
+                                        </p:tgtEl>
+                                        <p:attrNameLst>
+                                          <p:attrName>style.visibility</p:attrName>
+                                        </p:attrNameLst>
+                                      </p:cBhvr>
+                                      <p:to>
+                                        <p:strVal val="visible"/>
+                                      </p:to>
+                                    </p:set>
+                                  </p:childTnLst>
+                                </p:cTn>
+                              </p:par>
+                            </p:childTnLst>
+                          </p:cTn>
+                        </p:par>
+                      </p:childTnLst>
+                    </p:cTn>
+                  </p:par>
+                  <p:par>
+                    <p:cTn id="7" fill="hold">
+                      <p:stCondLst>
+                        <p:cond delay="indefinite"/>
+                      </p:stCondLst>
+                      <p:childTnLst>
+                        <p:par>
+                          <p:cTn id="8" fill="hold">
+                            <p:stCondLst>
+                              <p:cond delay="0"/>
+                            </p:stCondLst>
+                            <p:childTnLst>
+                              <p:par>
+                                <p:cTn id="9" presetID="1" presetClass="entr" presetSubtype="0" fill="hold" grpId="0" nodeType="clickEffect">
+                                  <p:stCondLst>
+                                    <p:cond delay="0"/>
+                                  </p:stCondLst>
+                                  <p:childTnLst>
+                                    <p:set>
+                                      <p:cBhvr>
+                                        <p:cTn id="10" dur="1" fill="hold">
+                                          <p:stCondLst>
+                                            <p:cond delay="0"/>
+                                          </p:stCondLst>
+                                        </p:cTn>
+                                        <p:tgtEl>
+                                          <p:spTgt spid="6"/>
+                                        </p:tgtEl>
+                                        <p:attrNameLst>
+                                          <p:attrName>style.visibility</p:attrName>
+                                        </p:attrNameLst>
+                                      </p:cBhvr>
+                                      <p:to>
+                                        <p:strVal val="visible"/>
+                                      </p:to>
+                                    </p:set>
+                                  </p:childTnLst>
+                                </p:cTn>
+                              </p:par>
+                            </p:childTnLst>
+                          </p:cTn>
+                        </p:par>
+                      </p:childTnLst>
+                    </p:cTn>
+                  </p:par>
+                  <p:par>
+                    <p:cTn id="11" fill="hold">
+                      <p:stCondLst>
+                        <p:cond delay="indefinite"/>
+                      </p:stCondLst>
+                      <p:childTnLst>
+                        <p:par>
+                          <p:cTn id="12" fill="hold">
+                            <p:stCondLst>
+                              <p:cond delay="0"/>
+                            </p:stCondLst>
+                            <p:childTnLst>
+                              <p:par>
+                                <p:cTn id="13" presetID="10" presetClass="entr" presetSubtype="0" fill="hold" grpId="0" nodeType="clickEffect">
+                                  <p:stCondLst>
+                                    <p:cond delay="0"/>
+                                  </p:stCondLst>
+                                  <p:childTnLst>
+                                    <p:set>
+                                      <p:cBhvr>
+                                        <p:cTn id="14" dur="1" fill="hold">
+                                          <p:stCondLst>
+                                            <p:cond delay="0"/>
+                                          </p:stCondLst>
+                                        </p:cTn>
+                                        <p:tgtEl>
+                                          <p:spTgt spid="5"/>
+                                        </p:tgtEl>
+                                        <p:attrNameLst>
+                                          <p:attrName>style.visibility</p:attrName>
+                                        </p:attrNameLst>
+                                      </p:cBhvr>
+                                      <p:to>
+                                        <p:strVal val="visible"/>
+                                      </p:to>
+                                    </p:set>
+                                    <p:animEffect transition="in" filter="fade">
+                                      <p:cBhvr>
+                                        <p:cTn id="15" dur="500"/>
+                                        <p:tgtEl>
+                                          <p:spTgt spid="5"/>
+                                        </p:tgtEl>
+                                      </p:cBhvr>
+                                    </p:animEffect>
+                                  </p:childTnLst>
+                                </p:cTn>
+                              </p:par>
+                            </p:childTnLst>
+                          </p:cTn>
+                        </p:par>
+                      </p:childTnLst>
+                    </p:cTn>
+                  </p:par>
+                  <p:par>
+                    <p:cTn id="16" fill="hold">
+                      <p:stCondLst>
+                        <p:cond delay="indefinite"/>
+                      </p:stCondLst>
+                      <p:childTnLst>
+                        <p:par>
+                          <p:cTn id="17" fill="hold">
+                            <p:stCondLst>
+                              <p:cond delay="0"/>
+                            </p:stCondLst>
+                            <p:childTnLst>
+                              <p:par>
+                                <p:cTn id="18" presetID="1" presetClass="entr" presetSubtype="0" fill="hold" grpId="0" nodeType="clickEffect">
+                                  <p:stCondLst>
+                                    <p:cond delay="0"/>
+                                  </p:stCondLst>
+                                  <p:childTnLst>
+                                    <p:set>
+                                      <p:cBhvr>
+                                        <p:cTn id="19" dur="1" fill="hold">
+                                          <p:stCondLst>
+                                            <p:cond delay="0"/>
+                                          </p:stCondLst>
+                                        </p:cTn>
+                                        <p:tgtEl>
+                                          <p:spTgt spid="7"/>
+                                        </p:tgtEl>
+                                        <p:attrNameLst>
+                                          <p:attrName>style.visibility</p:attrName>
+                                        </p:attrNameLst>
+                                      </p:cBhvr>
+                                      <p:to>
+                                        <p:strVal val="visible"/>
+                                      </p:to>
+                                    </p:set>
+                                  </p:childTnLst>
+                                </p:cTn>
+                              </p:par>
+                            </p:childTnLst>
+                          </p:cTn>
+                        </p:par>
+                      </p:childTnLst>
+                    </p:cTn>
+                  </p:par>
+                  <p:par>
+                    <p:cTn id="20" fill="hold">
+                      <p:stCondLst>
+                        <p:cond delay="indefinite"/>
+                      </p:stCondLst>
+                      <p:childTnLst>
+                        <p:par>
+                          <p:cTn id="21" fill="hold">
+                            <p:stCondLst>
+                              <p:cond delay="0"/>
+                            </p:stCondLst>
+                            <p:childTnLst>
+                              <p:par>
+                                <p:cTn id="22" presetID="26" presetClass="emph" presetSubtype="0" fill="hold" nodeType="clickEffect">
+                                  <p:stCondLst>
+                                    <p:cond delay="0"/>
+                                  </p:stCondLst>
+                                  <p:childTnLst>
+                                    <p:animEffect transition="out" filter="fade">
+                                      <p:cBhvr>
+                                        <p:cTn id="23" dur="500" tmFilter="0, 0; .2, .5; .8, .5; 1, 0"/>
+                                        <p:tgtEl>
+                                          <p:spTgt spid="2"/>
+                                        </p:tgtEl>
+                                      </p:cBhvr>
+                                    </p:animEffect>
+                                    <p:animScale>
+                                      <p:cBhvr>
+                                        <p:cTn id="24" dur="250" autoRev="1" fill="hold"/>
+                                        <p:tgtEl>
+                                          <p:spTgt spid="2"/>
+                                        </p:tgtEl>
+                                      </p:cBhvr>
+                                      <p:by x="105000" y="105000"/>
+                                    </p:animScale>
+                                  </p:childTnLst>
+                                </p:cTn>
+                              </p:par>
+                            </p:childTnLst>
+                          </p:cTn>
+                        </p:par>
+                      </p:childTnLst>
+                    </p:cTn>
+                  </p:par>
+                </p:childTnLst>
+              </p:cTn>
+              <p:prevCondLst>
+                <p:cond evt="onPrev" delay="0">
+                  <p:tgtEl>
+                    <p:sldTgt/>
+                  </p:tgtEl>
+                </p:cond>
+              </p:prevCondLst>
+              <p:nextCondLst>
+                <p:cond evt="onNext" delay="0">
+                  <p:tgtEl>
+                    <p:sldTgt/>
+                  </p:tgtEl>
+                </p:cond>
+              </p:nextCondLst>
+            </p:seq>
+          </p:childTnLst>
+        </p:cTn>
+      </p:par>
+    </p:tnLst>
+    <p:bldLst>
+      <p:bldP spid="4" grpId="0"/>
+      <p:bldP spid="5" grpId="0"/>
+      <p:bldP spid="6" grpId="0"/>
+      <p:bldP spid="7" grpId="0"/>
+    </p:bldLst>
+  </p:timing>
 </p:sld>
 </file>
 
@@ -14285,6 +16426,375 @@
   <p:clrMapOvr>
     <a:masterClrMapping/>
   </p:clrMapOvr>
+  <p:timing>
+    <p:tnLst>
+      <p:par>
+        <p:cTn id="1" dur="indefinite" restart="never" nodeType="tmRoot">
+          <p:childTnLst>
+            <p:seq concurrent="1" nextAc="seek">
+              <p:cTn id="2" dur="indefinite" nodeType="mainSeq">
+                <p:childTnLst>
+                  <p:par>
+                    <p:cTn id="3" fill="hold">
+                      <p:stCondLst>
+                        <p:cond delay="indefinite"/>
+                      </p:stCondLst>
+                      <p:childTnLst>
+                        <p:par>
+                          <p:cTn id="4" fill="hold">
+                            <p:stCondLst>
+                              <p:cond delay="0"/>
+                            </p:stCondLst>
+                            <p:childTnLst>
+                              <p:par>
+                                <p:cTn id="5" presetID="1" presetClass="entr" presetSubtype="0" fill="hold" grpId="0" nodeType="clickEffect">
+                                  <p:stCondLst>
+                                    <p:cond delay="0"/>
+                                  </p:stCondLst>
+                                  <p:childTnLst>
+                                    <p:set>
+                                      <p:cBhvr>
+                                        <p:cTn id="6" dur="1" fill="hold">
+                                          <p:stCondLst>
+                                            <p:cond delay="0"/>
+                                          </p:stCondLst>
+                                        </p:cTn>
+                                        <p:tgtEl>
+                                          <p:spTgt spid="2"/>
+                                        </p:tgtEl>
+                                        <p:attrNameLst>
+                                          <p:attrName>style.visibility</p:attrName>
+                                        </p:attrNameLst>
+                                      </p:cBhvr>
+                                      <p:to>
+                                        <p:strVal val="visible"/>
+                                      </p:to>
+                                    </p:set>
+                                  </p:childTnLst>
+                                </p:cTn>
+                              </p:par>
+                            </p:childTnLst>
+                          </p:cTn>
+                        </p:par>
+                      </p:childTnLst>
+                    </p:cTn>
+                  </p:par>
+                  <p:par>
+                    <p:cTn id="7" fill="hold">
+                      <p:stCondLst>
+                        <p:cond delay="indefinite"/>
+                      </p:stCondLst>
+                      <p:childTnLst>
+                        <p:par>
+                          <p:cTn id="8" fill="hold">
+                            <p:stCondLst>
+                              <p:cond delay="0"/>
+                            </p:stCondLst>
+                            <p:childTnLst>
+                              <p:par>
+                                <p:cTn id="9" presetID="1" presetClass="entr" presetSubtype="0" fill="hold" nodeType="clickEffect">
+                                  <p:stCondLst>
+                                    <p:cond delay="0"/>
+                                  </p:stCondLst>
+                                  <p:childTnLst>
+                                    <p:set>
+                                      <p:cBhvr>
+                                        <p:cTn id="10" dur="1" fill="hold">
+                                          <p:stCondLst>
+                                            <p:cond delay="0"/>
+                                          </p:stCondLst>
+                                        </p:cTn>
+                                        <p:tgtEl>
+                                          <p:spTgt spid="3"/>
+                                        </p:tgtEl>
+                                        <p:attrNameLst>
+                                          <p:attrName>style.visibility</p:attrName>
+                                        </p:attrNameLst>
+                                      </p:cBhvr>
+                                      <p:to>
+                                        <p:strVal val="visible"/>
+                                      </p:to>
+                                    </p:set>
+                                  </p:childTnLst>
+                                </p:cTn>
+                              </p:par>
+                            </p:childTnLst>
+                          </p:cTn>
+                        </p:par>
+                      </p:childTnLst>
+                    </p:cTn>
+                  </p:par>
+                  <p:par>
+                    <p:cTn id="11" fill="hold">
+                      <p:stCondLst>
+                        <p:cond delay="indefinite"/>
+                      </p:stCondLst>
+                      <p:childTnLst>
+                        <p:par>
+                          <p:cTn id="12" fill="hold">
+                            <p:stCondLst>
+                              <p:cond delay="0"/>
+                            </p:stCondLst>
+                            <p:childTnLst>
+                              <p:par>
+                                <p:cTn id="13" presetID="1" presetClass="entr" presetSubtype="0" fill="hold" grpId="0" nodeType="clickEffect">
+                                  <p:stCondLst>
+                                    <p:cond delay="0"/>
+                                  </p:stCondLst>
+                                  <p:childTnLst>
+                                    <p:set>
+                                      <p:cBhvr>
+                                        <p:cTn id="14" dur="1" fill="hold">
+                                          <p:stCondLst>
+                                            <p:cond delay="0"/>
+                                          </p:stCondLst>
+                                        </p:cTn>
+                                        <p:tgtEl>
+                                          <p:spTgt spid="4">
+                                            <p:txEl>
+                                              <p:pRg st="0" end="0"/>
+                                            </p:txEl>
+                                          </p:spTgt>
+                                        </p:tgtEl>
+                                        <p:attrNameLst>
+                                          <p:attrName>style.visibility</p:attrName>
+                                        </p:attrNameLst>
+                                      </p:cBhvr>
+                                      <p:to>
+                                        <p:strVal val="visible"/>
+                                      </p:to>
+                                    </p:set>
+                                  </p:childTnLst>
+                                </p:cTn>
+                              </p:par>
+                            </p:childTnLst>
+                          </p:cTn>
+                        </p:par>
+                      </p:childTnLst>
+                    </p:cTn>
+                  </p:par>
+                  <p:par>
+                    <p:cTn id="15" fill="hold">
+                      <p:stCondLst>
+                        <p:cond delay="indefinite"/>
+                      </p:stCondLst>
+                      <p:childTnLst>
+                        <p:par>
+                          <p:cTn id="16" fill="hold">
+                            <p:stCondLst>
+                              <p:cond delay="0"/>
+                            </p:stCondLst>
+                            <p:childTnLst>
+                              <p:par>
+                                <p:cTn id="17" presetID="1" presetClass="entr" presetSubtype="0" fill="hold" grpId="0" nodeType="clickEffect">
+                                  <p:stCondLst>
+                                    <p:cond delay="0"/>
+                                  </p:stCondLst>
+                                  <p:childTnLst>
+                                    <p:set>
+                                      <p:cBhvr>
+                                        <p:cTn id="18" dur="1" fill="hold">
+                                          <p:stCondLst>
+                                            <p:cond delay="0"/>
+                                          </p:stCondLst>
+                                        </p:cTn>
+                                        <p:tgtEl>
+                                          <p:spTgt spid="4">
+                                            <p:txEl>
+                                              <p:pRg st="1" end="1"/>
+                                            </p:txEl>
+                                          </p:spTgt>
+                                        </p:tgtEl>
+                                        <p:attrNameLst>
+                                          <p:attrName>style.visibility</p:attrName>
+                                        </p:attrNameLst>
+                                      </p:cBhvr>
+                                      <p:to>
+                                        <p:strVal val="visible"/>
+                                      </p:to>
+                                    </p:set>
+                                  </p:childTnLst>
+                                </p:cTn>
+                              </p:par>
+                            </p:childTnLst>
+                          </p:cTn>
+                        </p:par>
+                      </p:childTnLst>
+                    </p:cTn>
+                  </p:par>
+                  <p:par>
+                    <p:cTn id="19" fill="hold">
+                      <p:stCondLst>
+                        <p:cond delay="indefinite"/>
+                      </p:stCondLst>
+                      <p:childTnLst>
+                        <p:par>
+                          <p:cTn id="20" fill="hold">
+                            <p:stCondLst>
+                              <p:cond delay="0"/>
+                            </p:stCondLst>
+                            <p:childTnLst>
+                              <p:par>
+                                <p:cTn id="21" presetID="1" presetClass="entr" presetSubtype="0" fill="hold" grpId="0" nodeType="clickEffect">
+                                  <p:stCondLst>
+                                    <p:cond delay="0"/>
+                                  </p:stCondLst>
+                                  <p:childTnLst>
+                                    <p:set>
+                                      <p:cBhvr>
+                                        <p:cTn id="22" dur="1" fill="hold">
+                                          <p:stCondLst>
+                                            <p:cond delay="0"/>
+                                          </p:stCondLst>
+                                        </p:cTn>
+                                        <p:tgtEl>
+                                          <p:spTgt spid="4">
+                                            <p:txEl>
+                                              <p:pRg st="2" end="2"/>
+                                            </p:txEl>
+                                          </p:spTgt>
+                                        </p:tgtEl>
+                                        <p:attrNameLst>
+                                          <p:attrName>style.visibility</p:attrName>
+                                        </p:attrNameLst>
+                                      </p:cBhvr>
+                                      <p:to>
+                                        <p:strVal val="visible"/>
+                                      </p:to>
+                                    </p:set>
+                                  </p:childTnLst>
+                                </p:cTn>
+                              </p:par>
+                            </p:childTnLst>
+                          </p:cTn>
+                        </p:par>
+                      </p:childTnLst>
+                    </p:cTn>
+                  </p:par>
+                  <p:par>
+                    <p:cTn id="23" fill="hold">
+                      <p:stCondLst>
+                        <p:cond delay="indefinite"/>
+                      </p:stCondLst>
+                      <p:childTnLst>
+                        <p:par>
+                          <p:cTn id="24" fill="hold">
+                            <p:stCondLst>
+                              <p:cond delay="0"/>
+                            </p:stCondLst>
+                            <p:childTnLst>
+                              <p:par>
+                                <p:cTn id="25" presetID="1" presetClass="entr" presetSubtype="0" fill="hold" grpId="0" nodeType="clickEffect">
+                                  <p:stCondLst>
+                                    <p:cond delay="0"/>
+                                  </p:stCondLst>
+                                  <p:childTnLst>
+                                    <p:set>
+                                      <p:cBhvr>
+                                        <p:cTn id="26" dur="1" fill="hold">
+                                          <p:stCondLst>
+                                            <p:cond delay="0"/>
+                                          </p:stCondLst>
+                                        </p:cTn>
+                                        <p:tgtEl>
+                                          <p:spTgt spid="4">
+                                            <p:txEl>
+                                              <p:pRg st="3" end="3"/>
+                                            </p:txEl>
+                                          </p:spTgt>
+                                        </p:tgtEl>
+                                        <p:attrNameLst>
+                                          <p:attrName>style.visibility</p:attrName>
+                                        </p:attrNameLst>
+                                      </p:cBhvr>
+                                      <p:to>
+                                        <p:strVal val="visible"/>
+                                      </p:to>
+                                    </p:set>
+                                  </p:childTnLst>
+                                </p:cTn>
+                              </p:par>
+                            </p:childTnLst>
+                          </p:cTn>
+                        </p:par>
+                      </p:childTnLst>
+                    </p:cTn>
+                  </p:par>
+                  <p:par>
+                    <p:cTn id="27" fill="hold">
+                      <p:stCondLst>
+                        <p:cond delay="indefinite"/>
+                      </p:stCondLst>
+                      <p:childTnLst>
+                        <p:par>
+                          <p:cTn id="28" fill="hold">
+                            <p:stCondLst>
+                              <p:cond delay="0"/>
+                            </p:stCondLst>
+                            <p:childTnLst>
+                              <p:par>
+                                <p:cTn id="29" presetID="1" presetClass="entr" presetSubtype="0" fill="hold" grpId="0" nodeType="clickEffect">
+                                  <p:stCondLst>
+                                    <p:cond delay="0"/>
+                                  </p:stCondLst>
+                                  <p:childTnLst>
+                                    <p:set>
+                                      <p:cBhvr>
+                                        <p:cTn id="30" dur="1" fill="hold">
+                                          <p:stCondLst>
+                                            <p:cond delay="0"/>
+                                          </p:stCondLst>
+                                        </p:cTn>
+                                        <p:tgtEl>
+                                          <p:spTgt spid="4">
+                                            <p:txEl>
+                                              <p:pRg st="4" end="4"/>
+                                            </p:txEl>
+                                          </p:spTgt>
+                                        </p:tgtEl>
+                                        <p:attrNameLst>
+                                          <p:attrName>style.visibility</p:attrName>
+                                        </p:attrNameLst>
+                                      </p:cBhvr>
+                                      <p:to>
+                                        <p:strVal val="visible"/>
+                                      </p:to>
+                                    </p:set>
+                                  </p:childTnLst>
+                                </p:cTn>
+                              </p:par>
+                            </p:childTnLst>
+                          </p:cTn>
+                        </p:par>
+                      </p:childTnLst>
+                    </p:cTn>
+                  </p:par>
+                </p:childTnLst>
+              </p:cTn>
+              <p:prevCondLst>
+                <p:cond evt="onPrev" delay="0">
+                  <p:tgtEl>
+                    <p:sldTgt/>
+                  </p:tgtEl>
+                </p:cond>
+              </p:prevCondLst>
+              <p:nextCondLst>
+                <p:cond evt="onNext" delay="0">
+                  <p:tgtEl>
+                    <p:sldTgt/>
+                  </p:tgtEl>
+                </p:cond>
+              </p:nextCondLst>
+            </p:seq>
+          </p:childTnLst>
+        </p:cTn>
+      </p:par>
+    </p:tnLst>
+    <p:bldLst>
+      <p:bldP spid="2" grpId="0"/>
+      <p:bldP spid="4" grpId="0" uiExpand="1" build="p"/>
+    </p:bldLst>
+  </p:timing>
 </p:sld>
 </file>
 
@@ -14374,7 +16884,7 @@
         </p:nvSpPr>
         <p:spPr>
           <a:xfrm>
-            <a:off x="4644009" y="1131590"/>
+            <a:off x="4600375" y="1203598"/>
             <a:ext cx="3888432" cy="2031325"/>
           </a:xfrm>
           <a:prstGeom prst="rect">
@@ -14472,6 +16982,254 @@
   <p:clrMapOvr>
     <a:masterClrMapping/>
   </p:clrMapOvr>
+  <p:timing>
+    <p:tnLst>
+      <p:par>
+        <p:cTn id="1" dur="indefinite" restart="never" nodeType="tmRoot">
+          <p:childTnLst>
+            <p:seq concurrent="1" nextAc="seek">
+              <p:cTn id="2" dur="indefinite" nodeType="mainSeq">
+                <p:childTnLst>
+                  <p:par>
+                    <p:cTn id="3" fill="hold">
+                      <p:stCondLst>
+                        <p:cond delay="indefinite"/>
+                      </p:stCondLst>
+                      <p:childTnLst>
+                        <p:par>
+                          <p:cTn id="4" fill="hold">
+                            <p:stCondLst>
+                              <p:cond delay="0"/>
+                            </p:stCondLst>
+                            <p:childTnLst>
+                              <p:par>
+                                <p:cTn id="5" presetID="1" presetClass="entr" presetSubtype="0" fill="hold" nodeType="clickEffect">
+                                  <p:stCondLst>
+                                    <p:cond delay="0"/>
+                                  </p:stCondLst>
+                                  <p:childTnLst>
+                                    <p:set>
+                                      <p:cBhvr>
+                                        <p:cTn id="6" dur="1" fill="hold">
+                                          <p:stCondLst>
+                                            <p:cond delay="0"/>
+                                          </p:stCondLst>
+                                        </p:cTn>
+                                        <p:tgtEl>
+                                          <p:spTgt spid="2">
+                                            <p:txEl>
+                                              <p:pRg st="0" end="0"/>
+                                            </p:txEl>
+                                          </p:spTgt>
+                                        </p:tgtEl>
+                                        <p:attrNameLst>
+                                          <p:attrName>style.visibility</p:attrName>
+                                        </p:attrNameLst>
+                                      </p:cBhvr>
+                                      <p:to>
+                                        <p:strVal val="visible"/>
+                                      </p:to>
+                                    </p:set>
+                                  </p:childTnLst>
+                                </p:cTn>
+                              </p:par>
+                            </p:childTnLst>
+                          </p:cTn>
+                        </p:par>
+                      </p:childTnLst>
+                    </p:cTn>
+                  </p:par>
+                  <p:par>
+                    <p:cTn id="7" fill="hold">
+                      <p:stCondLst>
+                        <p:cond delay="indefinite"/>
+                      </p:stCondLst>
+                      <p:childTnLst>
+                        <p:par>
+                          <p:cTn id="8" fill="hold">
+                            <p:stCondLst>
+                              <p:cond delay="0"/>
+                            </p:stCondLst>
+                            <p:childTnLst>
+                              <p:par>
+                                <p:cTn id="9" presetID="1" presetClass="entr" presetSubtype="0" fill="hold" nodeType="clickEffect">
+                                  <p:stCondLst>
+                                    <p:cond delay="0"/>
+                                  </p:stCondLst>
+                                  <p:childTnLst>
+                                    <p:set>
+                                      <p:cBhvr>
+                                        <p:cTn id="10" dur="1" fill="hold">
+                                          <p:stCondLst>
+                                            <p:cond delay="0"/>
+                                          </p:stCondLst>
+                                        </p:cTn>
+                                        <p:tgtEl>
+                                          <p:spTgt spid="2">
+                                            <p:txEl>
+                                              <p:pRg st="3" end="3"/>
+                                            </p:txEl>
+                                          </p:spTgt>
+                                        </p:tgtEl>
+                                        <p:attrNameLst>
+                                          <p:attrName>style.visibility</p:attrName>
+                                        </p:attrNameLst>
+                                      </p:cBhvr>
+                                      <p:to>
+                                        <p:strVal val="visible"/>
+                                      </p:to>
+                                    </p:set>
+                                  </p:childTnLst>
+                                </p:cTn>
+                              </p:par>
+                              <p:par>
+                                <p:cTn id="11" presetID="1" presetClass="entr" presetSubtype="0" fill="hold" nodeType="withEffect">
+                                  <p:stCondLst>
+                                    <p:cond delay="0"/>
+                                  </p:stCondLst>
+                                  <p:childTnLst>
+                                    <p:set>
+                                      <p:cBhvr>
+                                        <p:cTn id="12" dur="1" fill="hold">
+                                          <p:stCondLst>
+                                            <p:cond delay="0"/>
+                                          </p:stCondLst>
+                                        </p:cTn>
+                                        <p:tgtEl>
+                                          <p:spTgt spid="2">
+                                            <p:txEl>
+                                              <p:pRg st="4" end="4"/>
+                                            </p:txEl>
+                                          </p:spTgt>
+                                        </p:tgtEl>
+                                        <p:attrNameLst>
+                                          <p:attrName>style.visibility</p:attrName>
+                                        </p:attrNameLst>
+                                      </p:cBhvr>
+                                      <p:to>
+                                        <p:strVal val="visible"/>
+                                      </p:to>
+                                    </p:set>
+                                  </p:childTnLst>
+                                </p:cTn>
+                              </p:par>
+                            </p:childTnLst>
+                          </p:cTn>
+                        </p:par>
+                        <p:par>
+                          <p:cTn id="13" fill="hold">
+                            <p:stCondLst>
+                              <p:cond delay="0"/>
+                            </p:stCondLst>
+                            <p:childTnLst>
+                              <p:par>
+                                <p:cTn id="14" presetID="1" presetClass="entr" presetSubtype="0" fill="hold" nodeType="afterEffect">
+                                  <p:stCondLst>
+                                    <p:cond delay="0"/>
+                                  </p:stCondLst>
+                                  <p:childTnLst>
+                                    <p:set>
+                                      <p:cBhvr>
+                                        <p:cTn id="15" dur="1" fill="hold">
+                                          <p:stCondLst>
+                                            <p:cond delay="0"/>
+                                          </p:stCondLst>
+                                        </p:cTn>
+                                        <p:tgtEl>
+                                          <p:spTgt spid="4"/>
+                                        </p:tgtEl>
+                                        <p:attrNameLst>
+                                          <p:attrName>style.visibility</p:attrName>
+                                        </p:attrNameLst>
+                                      </p:cBhvr>
+                                      <p:to>
+                                        <p:strVal val="visible"/>
+                                      </p:to>
+                                    </p:set>
+                                  </p:childTnLst>
+                                </p:cTn>
+                              </p:par>
+                            </p:childTnLst>
+                          </p:cTn>
+                        </p:par>
+                      </p:childTnLst>
+                    </p:cTn>
+                  </p:par>
+                  <p:par>
+                    <p:cTn id="16" fill="hold">
+                      <p:stCondLst>
+                        <p:cond delay="indefinite"/>
+                      </p:stCondLst>
+                      <p:childTnLst>
+                        <p:par>
+                          <p:cTn id="17" fill="hold">
+                            <p:stCondLst>
+                              <p:cond delay="0"/>
+                            </p:stCondLst>
+                            <p:childTnLst>
+                              <p:par>
+                                <p:cTn id="18" presetID="10" presetClass="entr" presetSubtype="0" fill="hold" nodeType="clickEffect">
+                                  <p:stCondLst>
+                                    <p:cond delay="0"/>
+                                  </p:stCondLst>
+                                  <p:childTnLst>
+                                    <p:set>
+                                      <p:cBhvr>
+                                        <p:cTn id="19" dur="1" fill="hold">
+                                          <p:stCondLst>
+                                            <p:cond delay="0"/>
+                                          </p:stCondLst>
+                                        </p:cTn>
+                                        <p:tgtEl>
+                                          <p:spTgt spid="1026"/>
+                                        </p:tgtEl>
+                                        <p:attrNameLst>
+                                          <p:attrName>style.visibility</p:attrName>
+                                        </p:attrNameLst>
+                                      </p:cBhvr>
+                                      <p:to>
+                                        <p:strVal val="visible"/>
+                                      </p:to>
+                                    </p:set>
+                                    <p:animEffect transition="in" filter="fade">
+                                      <p:cBhvr>
+                                        <p:cTn id="20" dur="500"/>
+                                        <p:tgtEl>
+                                          <p:spTgt spid="1026"/>
+                                        </p:tgtEl>
+                                      </p:cBhvr>
+                                    </p:animEffect>
+                                  </p:childTnLst>
+                                </p:cTn>
+                              </p:par>
+                            </p:childTnLst>
+                          </p:cTn>
+                        </p:par>
+                      </p:childTnLst>
+                    </p:cTn>
+                  </p:par>
+                </p:childTnLst>
+              </p:cTn>
+              <p:prevCondLst>
+                <p:cond evt="onPrev" delay="0">
+                  <p:tgtEl>
+                    <p:sldTgt/>
+                  </p:tgtEl>
+                </p:cond>
+              </p:prevCondLst>
+              <p:nextCondLst>
+                <p:cond evt="onNext" delay="0">
+                  <p:tgtEl>
+                    <p:sldTgt/>
+                  </p:tgtEl>
+                </p:cond>
+              </p:nextCondLst>
+            </p:seq>
+          </p:childTnLst>
+        </p:cTn>
+      </p:par>
+    </p:tnLst>
+  </p:timing>
 </p:sld>
 </file>
 
@@ -14629,6 +17387,284 @@
   <p:clrMapOvr>
     <a:masterClrMapping/>
   </p:clrMapOvr>
+  <p:timing>
+    <p:tnLst>
+      <p:par>
+        <p:cTn id="1" dur="indefinite" restart="never" nodeType="tmRoot">
+          <p:childTnLst>
+            <p:seq concurrent="1" nextAc="seek">
+              <p:cTn id="2" dur="indefinite" nodeType="mainSeq">
+                <p:childTnLst>
+                  <p:par>
+                    <p:cTn id="3" fill="hold">
+                      <p:stCondLst>
+                        <p:cond delay="indefinite"/>
+                      </p:stCondLst>
+                      <p:childTnLst>
+                        <p:par>
+                          <p:cTn id="4" fill="hold">
+                            <p:stCondLst>
+                              <p:cond delay="0"/>
+                            </p:stCondLst>
+                            <p:childTnLst>
+                              <p:par>
+                                <p:cTn id="5" presetID="1" presetClass="entr" presetSubtype="0" fill="hold" grpId="0" nodeType="clickEffect">
+                                  <p:stCondLst>
+                                    <p:cond delay="0"/>
+                                  </p:stCondLst>
+                                  <p:childTnLst>
+                                    <p:set>
+                                      <p:cBhvr>
+                                        <p:cTn id="6" dur="1" fill="hold">
+                                          <p:stCondLst>
+                                            <p:cond delay="0"/>
+                                          </p:stCondLst>
+                                        </p:cTn>
+                                        <p:tgtEl>
+                                          <p:spTgt spid="3">
+                                            <p:txEl>
+                                              <p:pRg st="0" end="0"/>
+                                            </p:txEl>
+                                          </p:spTgt>
+                                        </p:tgtEl>
+                                        <p:attrNameLst>
+                                          <p:attrName>style.visibility</p:attrName>
+                                        </p:attrNameLst>
+                                      </p:cBhvr>
+                                      <p:to>
+                                        <p:strVal val="visible"/>
+                                      </p:to>
+                                    </p:set>
+                                  </p:childTnLst>
+                                </p:cTn>
+                              </p:par>
+                            </p:childTnLst>
+                          </p:cTn>
+                        </p:par>
+                      </p:childTnLst>
+                    </p:cTn>
+                  </p:par>
+                  <p:par>
+                    <p:cTn id="7" fill="hold">
+                      <p:stCondLst>
+                        <p:cond delay="indefinite"/>
+                      </p:stCondLst>
+                      <p:childTnLst>
+                        <p:par>
+                          <p:cTn id="8" fill="hold">
+                            <p:stCondLst>
+                              <p:cond delay="0"/>
+                            </p:stCondLst>
+                            <p:childTnLst>
+                              <p:par>
+                                <p:cTn id="9" presetID="1" presetClass="entr" presetSubtype="0" fill="hold" nodeType="clickEffect">
+                                  <p:stCondLst>
+                                    <p:cond delay="0"/>
+                                  </p:stCondLst>
+                                  <p:childTnLst>
+                                    <p:set>
+                                      <p:cBhvr>
+                                        <p:cTn id="10" dur="1" fill="hold">
+                                          <p:stCondLst>
+                                            <p:cond delay="0"/>
+                                          </p:stCondLst>
+                                        </p:cTn>
+                                        <p:tgtEl>
+                                          <p:spTgt spid="3">
+                                            <p:txEl>
+                                              <p:pRg st="2" end="2"/>
+                                            </p:txEl>
+                                          </p:spTgt>
+                                        </p:tgtEl>
+                                        <p:attrNameLst>
+                                          <p:attrName>style.visibility</p:attrName>
+                                        </p:attrNameLst>
+                                      </p:cBhvr>
+                                      <p:to>
+                                        <p:strVal val="visible"/>
+                                      </p:to>
+                                    </p:set>
+                                  </p:childTnLst>
+                                </p:cTn>
+                              </p:par>
+                            </p:childTnLst>
+                          </p:cTn>
+                        </p:par>
+                      </p:childTnLst>
+                    </p:cTn>
+                  </p:par>
+                  <p:par>
+                    <p:cTn id="11" fill="hold">
+                      <p:stCondLst>
+                        <p:cond delay="indefinite"/>
+                      </p:stCondLst>
+                      <p:childTnLst>
+                        <p:par>
+                          <p:cTn id="12" fill="hold">
+                            <p:stCondLst>
+                              <p:cond delay="0"/>
+                            </p:stCondLst>
+                            <p:childTnLst>
+                              <p:par>
+                                <p:cTn id="13" presetID="1" presetClass="entr" presetSubtype="0" fill="hold" nodeType="clickEffect">
+                                  <p:stCondLst>
+                                    <p:cond delay="0"/>
+                                  </p:stCondLst>
+                                  <p:childTnLst>
+                                    <p:set>
+                                      <p:cBhvr>
+                                        <p:cTn id="14" dur="1" fill="hold">
+                                          <p:stCondLst>
+                                            <p:cond delay="0"/>
+                                          </p:stCondLst>
+                                        </p:cTn>
+                                        <p:tgtEl>
+                                          <p:spTgt spid="3">
+                                            <p:txEl>
+                                              <p:pRg st="3" end="3"/>
+                                            </p:txEl>
+                                          </p:spTgt>
+                                        </p:tgtEl>
+                                        <p:attrNameLst>
+                                          <p:attrName>style.visibility</p:attrName>
+                                        </p:attrNameLst>
+                                      </p:cBhvr>
+                                      <p:to>
+                                        <p:strVal val="visible"/>
+                                      </p:to>
+                                    </p:set>
+                                  </p:childTnLst>
+                                </p:cTn>
+                              </p:par>
+                            </p:childTnLst>
+                          </p:cTn>
+                        </p:par>
+                      </p:childTnLst>
+                    </p:cTn>
+                  </p:par>
+                  <p:par>
+                    <p:cTn id="15" fill="hold">
+                      <p:stCondLst>
+                        <p:cond delay="indefinite"/>
+                      </p:stCondLst>
+                      <p:childTnLst>
+                        <p:par>
+                          <p:cTn id="16" fill="hold">
+                            <p:stCondLst>
+                              <p:cond delay="0"/>
+                            </p:stCondLst>
+                            <p:childTnLst>
+                              <p:par>
+                                <p:cTn id="17" presetID="1" presetClass="entr" presetSubtype="0" fill="hold" nodeType="clickEffect">
+                                  <p:stCondLst>
+                                    <p:cond delay="0"/>
+                                  </p:stCondLst>
+                                  <p:childTnLst>
+                                    <p:set>
+                                      <p:cBhvr>
+                                        <p:cTn id="18" dur="1" fill="hold">
+                                          <p:stCondLst>
+                                            <p:cond delay="0"/>
+                                          </p:stCondLst>
+                                        </p:cTn>
+                                        <p:tgtEl>
+                                          <p:spTgt spid="3">
+                                            <p:txEl>
+                                              <p:pRg st="4" end="4"/>
+                                            </p:txEl>
+                                          </p:spTgt>
+                                        </p:tgtEl>
+                                        <p:attrNameLst>
+                                          <p:attrName>style.visibility</p:attrName>
+                                        </p:attrNameLst>
+                                      </p:cBhvr>
+                                      <p:to>
+                                        <p:strVal val="visible"/>
+                                      </p:to>
+                                    </p:set>
+                                  </p:childTnLst>
+                                </p:cTn>
+                              </p:par>
+                            </p:childTnLst>
+                          </p:cTn>
+                        </p:par>
+                      </p:childTnLst>
+                    </p:cTn>
+                  </p:par>
+                  <p:par>
+                    <p:cTn id="19" fill="hold">
+                      <p:stCondLst>
+                        <p:cond delay="indefinite"/>
+                      </p:stCondLst>
+                      <p:childTnLst>
+                        <p:par>
+                          <p:cTn id="20" fill="hold">
+                            <p:stCondLst>
+                              <p:cond delay="0"/>
+                            </p:stCondLst>
+                            <p:childTnLst>
+                              <p:par>
+                                <p:cTn id="21" presetID="1" presetClass="entr" presetSubtype="0" fill="hold" nodeType="clickEffect">
+                                  <p:stCondLst>
+                                    <p:cond delay="0"/>
+                                  </p:stCondLst>
+                                  <p:childTnLst>
+                                    <p:set>
+                                      <p:cBhvr>
+                                        <p:cTn id="22" dur="1" fill="hold">
+                                          <p:stCondLst>
+                                            <p:cond delay="0"/>
+                                          </p:stCondLst>
+                                        </p:cTn>
+                                        <p:tgtEl>
+                                          <p:spTgt spid="3">
+                                            <p:txEl>
+                                              <p:pRg st="5" end="5"/>
+                                            </p:txEl>
+                                          </p:spTgt>
+                                        </p:tgtEl>
+                                        <p:attrNameLst>
+                                          <p:attrName>style.visibility</p:attrName>
+                                        </p:attrNameLst>
+                                      </p:cBhvr>
+                                      <p:to>
+                                        <p:strVal val="visible"/>
+                                      </p:to>
+                                    </p:set>
+                                  </p:childTnLst>
+                                </p:cTn>
+                              </p:par>
+                            </p:childTnLst>
+                          </p:cTn>
+                        </p:par>
+                      </p:childTnLst>
+                    </p:cTn>
+                  </p:par>
+                </p:childTnLst>
+              </p:cTn>
+              <p:prevCondLst>
+                <p:cond evt="onPrev" delay="0">
+                  <p:tgtEl>
+                    <p:sldTgt/>
+                  </p:tgtEl>
+                </p:cond>
+              </p:prevCondLst>
+              <p:nextCondLst>
+                <p:cond evt="onNext" delay="0">
+                  <p:tgtEl>
+                    <p:sldTgt/>
+                  </p:tgtEl>
+                </p:cond>
+              </p:nextCondLst>
+            </p:seq>
+          </p:childTnLst>
+        </p:cTn>
+      </p:par>
+    </p:tnLst>
+    <p:bldLst>
+      <p:bldP spid="3" grpId="0" uiExpand="1" build="p"/>
+    </p:bldLst>
+  </p:timing>
 </p:sld>
 </file>
 

</xml_diff>